<commit_message>
ikt ppt óra végi mentés
</commit_message>
<xml_diff>
--- a/ikt powerpoint.pptx
+++ b/ikt powerpoint.pptx
@@ -6,8 +6,8 @@
   </p:sldMasterIdLst>
   <p:sldIdLst>
     <p:sldId id="256" r:id="rId2"/>
-    <p:sldId id="261" r:id="rId3"/>
-    <p:sldId id="262" r:id="rId4"/>
+    <p:sldId id="265" r:id="rId3"/>
+    <p:sldId id="266" r:id="rId4"/>
     <p:sldId id="263" r:id="rId5"/>
     <p:sldId id="264" r:id="rId6"/>
     <p:sldId id="257" r:id="rId7"/>
@@ -112,6 +112,11 @@
       </a:defRPr>
     </a:lvl9pPr>
   </p:defaultTextStyle>
+  <p:extLst>
+    <p:ext uri="{EFAFB233-063F-42B5-8137-9DF3F51BA10A}">
+      <p15:sldGuideLst xmlns:p15="http://schemas.microsoft.com/office/powerpoint/2012/main"/>
+    </p:ext>
+  </p:extLst>
 </p:presentation>
 </file>
 
@@ -246,7 +251,7 @@
           <a:p>
             <a:fld id="{25A7EE50-FE4F-41FC-96A9-59C15C2B9FBA}" type="datetimeFigureOut">
               <a:rPr lang="hu-HU" smtClean="0"/>
-              <a:t>2022.09.12.</a:t>
+              <a:t>2022.09.14.</a:t>
             </a:fld>
             <a:endParaRPr lang="hu-HU"/>
           </a:p>
@@ -416,7 +421,7 @@
           <a:p>
             <a:fld id="{25A7EE50-FE4F-41FC-96A9-59C15C2B9FBA}" type="datetimeFigureOut">
               <a:rPr lang="hu-HU" smtClean="0"/>
-              <a:t>2022.09.12.</a:t>
+              <a:t>2022.09.14.</a:t>
             </a:fld>
             <a:endParaRPr lang="hu-HU"/>
           </a:p>
@@ -596,7 +601,7 @@
           <a:p>
             <a:fld id="{25A7EE50-FE4F-41FC-96A9-59C15C2B9FBA}" type="datetimeFigureOut">
               <a:rPr lang="hu-HU" smtClean="0"/>
-              <a:t>2022.09.12.</a:t>
+              <a:t>2022.09.14.</a:t>
             </a:fld>
             <a:endParaRPr lang="hu-HU"/>
           </a:p>
@@ -766,7 +771,7 @@
           <a:p>
             <a:fld id="{25A7EE50-FE4F-41FC-96A9-59C15C2B9FBA}" type="datetimeFigureOut">
               <a:rPr lang="hu-HU" smtClean="0"/>
-              <a:t>2022.09.12.</a:t>
+              <a:t>2022.09.14.</a:t>
             </a:fld>
             <a:endParaRPr lang="hu-HU"/>
           </a:p>
@@ -1012,7 +1017,7 @@
           <a:p>
             <a:fld id="{25A7EE50-FE4F-41FC-96A9-59C15C2B9FBA}" type="datetimeFigureOut">
               <a:rPr lang="hu-HU" smtClean="0"/>
-              <a:t>2022.09.12.</a:t>
+              <a:t>2022.09.14.</a:t>
             </a:fld>
             <a:endParaRPr lang="hu-HU"/>
           </a:p>
@@ -1244,7 +1249,7 @@
           <a:p>
             <a:fld id="{25A7EE50-FE4F-41FC-96A9-59C15C2B9FBA}" type="datetimeFigureOut">
               <a:rPr lang="hu-HU" smtClean="0"/>
-              <a:t>2022.09.12.</a:t>
+              <a:t>2022.09.14.</a:t>
             </a:fld>
             <a:endParaRPr lang="hu-HU"/>
           </a:p>
@@ -1611,7 +1616,7 @@
           <a:p>
             <a:fld id="{25A7EE50-FE4F-41FC-96A9-59C15C2B9FBA}" type="datetimeFigureOut">
               <a:rPr lang="hu-HU" smtClean="0"/>
-              <a:t>2022.09.12.</a:t>
+              <a:t>2022.09.14.</a:t>
             </a:fld>
             <a:endParaRPr lang="hu-HU"/>
           </a:p>
@@ -1729,7 +1734,7 @@
           <a:p>
             <a:fld id="{25A7EE50-FE4F-41FC-96A9-59C15C2B9FBA}" type="datetimeFigureOut">
               <a:rPr lang="hu-HU" smtClean="0"/>
-              <a:t>2022.09.12.</a:t>
+              <a:t>2022.09.14.</a:t>
             </a:fld>
             <a:endParaRPr lang="hu-HU"/>
           </a:p>
@@ -1824,7 +1829,7 @@
           <a:p>
             <a:fld id="{25A7EE50-FE4F-41FC-96A9-59C15C2B9FBA}" type="datetimeFigureOut">
               <a:rPr lang="hu-HU" smtClean="0"/>
-              <a:t>2022.09.12.</a:t>
+              <a:t>2022.09.14.</a:t>
             </a:fld>
             <a:endParaRPr lang="hu-HU"/>
           </a:p>
@@ -2101,7 +2106,7 @@
           <a:p>
             <a:fld id="{25A7EE50-FE4F-41FC-96A9-59C15C2B9FBA}" type="datetimeFigureOut">
               <a:rPr lang="hu-HU" smtClean="0"/>
-              <a:t>2022.09.12.</a:t>
+              <a:t>2022.09.14.</a:t>
             </a:fld>
             <a:endParaRPr lang="hu-HU"/>
           </a:p>
@@ -2354,7 +2359,7 @@
           <a:p>
             <a:fld id="{25A7EE50-FE4F-41FC-96A9-59C15C2B9FBA}" type="datetimeFigureOut">
               <a:rPr lang="hu-HU" smtClean="0"/>
-              <a:t>2022.09.12.</a:t>
+              <a:t>2022.09.14.</a:t>
             </a:fld>
             <a:endParaRPr lang="hu-HU"/>
           </a:p>
@@ -2567,7 +2572,7 @@
           <a:p>
             <a:fld id="{25A7EE50-FE4F-41FC-96A9-59C15C2B9FBA}" type="datetimeFigureOut">
               <a:rPr lang="hu-HU" smtClean="0"/>
-              <a:t>2022.09.12.</a:t>
+              <a:t>2022.09.14.</a:t>
             </a:fld>
             <a:endParaRPr lang="hu-HU"/>
           </a:p>
@@ -2982,11 +2987,36 @@
             <p:ph type="ctrTitle"/>
           </p:nvPr>
         </p:nvSpPr>
-        <p:spPr/>
-        <p:txBody>
-          <a:bodyPr/>
-          <a:lstStyle/>
-          <a:p>
+        <p:spPr>
+          <a:xfrm>
+            <a:off x="1524000" y="0"/>
+            <a:ext cx="9144000" cy="2387600"/>
+          </a:xfrm>
+        </p:spPr>
+        <p:txBody>
+          <a:bodyPr/>
+          <a:lstStyle/>
+          <a:p>
+            <a:r>
+              <a:rPr lang="hu-HU" dirty="0" err="1" smtClean="0"/>
+              <a:t>Android</a:t>
+            </a:r>
+            <a:r>
+              <a:rPr lang="hu-HU" dirty="0"/>
+              <a:t> </a:t>
+            </a:r>
+            <a:r>
+              <a:rPr lang="hu-HU" dirty="0" smtClean="0"/>
+              <a:t>illetve az </a:t>
+            </a:r>
+            <a:r>
+              <a:rPr lang="hu-HU" dirty="0" err="1" smtClean="0"/>
+              <a:t>iOS</a:t>
+            </a:r>
+            <a:r>
+              <a:rPr lang="hu-HU" dirty="0" smtClean="0"/>
+              <a:t> összehasonlítása</a:t>
+            </a:r>
             <a:endParaRPr lang="hu-HU" dirty="0"/>
           </a:p>
         </p:txBody>
@@ -3001,12 +3031,17 @@
             <p:ph type="subTitle" idx="1"/>
           </p:nvPr>
         </p:nvSpPr>
-        <p:spPr/>
-        <p:txBody>
-          <a:bodyPr/>
-          <a:lstStyle/>
-          <a:p>
-            <a:endParaRPr lang="hu-HU"/>
+        <p:spPr>
+          <a:xfrm>
+            <a:off x="1524000" y="3055628"/>
+            <a:ext cx="9144000" cy="1655762"/>
+          </a:xfrm>
+        </p:spPr>
+        <p:txBody>
+          <a:bodyPr/>
+          <a:lstStyle/>
+          <a:p>
+            <a:endParaRPr lang="hu-HU" dirty="0"/>
           </a:p>
         </p:txBody>
       </p:sp>
@@ -3050,12 +3085,22 @@
             <p:ph type="title"/>
           </p:nvPr>
         </p:nvSpPr>
-        <p:spPr/>
-        <p:txBody>
-          <a:bodyPr/>
-          <a:lstStyle/>
-          <a:p>
-            <a:endParaRPr lang="hu-HU"/>
+        <p:spPr>
+          <a:xfrm>
+            <a:off x="0" y="11151"/>
+            <a:ext cx="10515600" cy="1325563"/>
+          </a:xfrm>
+        </p:spPr>
+        <p:txBody>
+          <a:bodyPr/>
+          <a:lstStyle/>
+          <a:p>
+            <a:pPr algn="ctr"/>
+            <a:r>
+              <a:rPr lang="hu-HU" dirty="0" smtClean="0"/>
+              <a:t>Összehasonlítás</a:t>
+            </a:r>
+            <a:endParaRPr lang="hu-HU" dirty="0"/>
           </a:p>
         </p:txBody>
       </p:sp>
@@ -3066,22 +3111,174 @@
             <a:spLocks noGrp="1"/>
           </p:cNvSpPr>
           <p:nvPr>
-            <p:ph idx="1"/>
-          </p:nvPr>
-        </p:nvSpPr>
-        <p:spPr/>
-        <p:txBody>
-          <a:bodyPr/>
-          <a:lstStyle/>
-          <a:p>
-            <a:endParaRPr lang="hu-HU"/>
-          </a:p>
-        </p:txBody>
-      </p:sp>
+            <p:ph sz="half" idx="1"/>
+          </p:nvPr>
+        </p:nvSpPr>
+        <p:spPr>
+          <a:xfrm>
+            <a:off x="76200" y="2806932"/>
+            <a:ext cx="5181600" cy="4351338"/>
+          </a:xfrm>
+        </p:spPr>
+        <p:txBody>
+          <a:bodyPr/>
+          <a:lstStyle/>
+          <a:p>
+            <a:r>
+              <a:rPr lang="hu-HU" dirty="0" smtClean="0"/>
+              <a:t>1. verzió kiadása: 2008.szeptember 23.</a:t>
+            </a:r>
+          </a:p>
+          <a:p>
+            <a:r>
+              <a:rPr lang="hu-HU" dirty="0" smtClean="0"/>
+              <a:t>Fejlesztő(k): Google</a:t>
+            </a:r>
+          </a:p>
+          <a:p>
+            <a:r>
+              <a:rPr lang="hu-HU" dirty="0" smtClean="0"/>
+              <a:t>Forráskód: Nyílt</a:t>
+            </a:r>
+          </a:p>
+          <a:p>
+            <a:r>
+              <a:rPr lang="hu-HU" dirty="0" smtClean="0"/>
+              <a:t>Op. Rendszer: Unix szerű</a:t>
+            </a:r>
+          </a:p>
+          <a:p>
+            <a:r>
+              <a:rPr lang="hu-HU" dirty="0" smtClean="0"/>
+              <a:t>A verziókat édességekről nevezik el</a:t>
+            </a:r>
+          </a:p>
+        </p:txBody>
+      </p:sp>
+      <p:sp>
+        <p:nvSpPr>
+          <p:cNvPr id="4" name="Tartalom helye 3"/>
+          <p:cNvSpPr>
+            <a:spLocks noGrp="1"/>
+          </p:cNvSpPr>
+          <p:nvPr>
+            <p:ph sz="half" idx="2"/>
+          </p:nvPr>
+        </p:nvSpPr>
+        <p:spPr>
+          <a:xfrm>
+            <a:off x="7099609" y="2806932"/>
+            <a:ext cx="5181600" cy="4351338"/>
+          </a:xfrm>
+        </p:spPr>
+        <p:txBody>
+          <a:bodyPr/>
+          <a:lstStyle/>
+          <a:p>
+            <a:r>
+              <a:rPr lang="hu-HU" dirty="0" smtClean="0"/>
+              <a:t>1. verzió kiadása: 2007. június 29.</a:t>
+            </a:r>
+          </a:p>
+          <a:p>
+            <a:r>
+              <a:rPr lang="hu-HU" dirty="0" smtClean="0"/>
+              <a:t>Fejlesztő(k): Apple </a:t>
+            </a:r>
+            <a:r>
+              <a:rPr lang="hu-HU" dirty="0" err="1" smtClean="0"/>
+              <a:t>inc</a:t>
+            </a:r>
+            <a:r>
+              <a:rPr lang="hu-HU" dirty="0" smtClean="0"/>
+              <a:t>.</a:t>
+            </a:r>
+          </a:p>
+          <a:p>
+            <a:r>
+              <a:rPr lang="hu-HU" dirty="0" smtClean="0"/>
+              <a:t>Forráskód: Zárt</a:t>
+            </a:r>
+          </a:p>
+          <a:p>
+            <a:r>
+              <a:rPr lang="hu-HU" dirty="0" smtClean="0"/>
+              <a:t>Op. Rendszer:</a:t>
+            </a:r>
+          </a:p>
+          <a:p>
+            <a:r>
+              <a:rPr lang="hu-HU" dirty="0" smtClean="0"/>
+              <a:t>Az új verziókat növekvő számsorban nevezik el</a:t>
+            </a:r>
+            <a:endParaRPr lang="hu-HU" dirty="0"/>
+          </a:p>
+        </p:txBody>
+      </p:sp>
+      <p:pic>
+        <p:nvPicPr>
+          <p:cNvPr id="6" name="Kép 5"/>
+          <p:cNvPicPr>
+            <a:picLocks noChangeAspect="1"/>
+          </p:cNvPicPr>
+          <p:nvPr/>
+        </p:nvPicPr>
+        <p:blipFill>
+          <a:blip r:embed="rId2">
+            <a:extLst>
+              <a:ext uri="{28A0092B-C50C-407E-A947-70E740481C1C}">
+                <a14:useLocalDpi xmlns:a14="http://schemas.microsoft.com/office/drawing/2010/main" val="0"/>
+              </a:ext>
+            </a:extLst>
+          </a:blip>
+          <a:stretch>
+            <a:fillRect/>
+          </a:stretch>
+        </p:blipFill>
+        <p:spPr>
+          <a:xfrm>
+            <a:off x="538162" y="168275"/>
+            <a:ext cx="1971675" cy="2314575"/>
+          </a:xfrm>
+          <a:prstGeom prst="rect">
+            <a:avLst/>
+          </a:prstGeom>
+        </p:spPr>
+      </p:pic>
+      <p:pic>
+        <p:nvPicPr>
+          <p:cNvPr id="7" name="Kép 6"/>
+          <p:cNvPicPr>
+            <a:picLocks noChangeAspect="1"/>
+          </p:cNvPicPr>
+          <p:nvPr/>
+        </p:nvPicPr>
+        <p:blipFill>
+          <a:blip r:embed="rId3">
+            <a:extLst>
+              <a:ext uri="{28A0092B-C50C-407E-A947-70E740481C1C}">
+                <a14:useLocalDpi xmlns:a14="http://schemas.microsoft.com/office/drawing/2010/main" val="0"/>
+              </a:ext>
+            </a:extLst>
+          </a:blip>
+          <a:stretch>
+            <a:fillRect/>
+          </a:stretch>
+        </p:blipFill>
+        <p:spPr>
+          <a:xfrm>
+            <a:off x="8372475" y="168275"/>
+            <a:ext cx="2143125" cy="2143125"/>
+          </a:xfrm>
+          <a:prstGeom prst="rect">
+            <a:avLst/>
+          </a:prstGeom>
+        </p:spPr>
+      </p:pic>
     </p:spTree>
     <p:extLst>
       <p:ext uri="{BB962C8B-B14F-4D97-AF65-F5344CB8AC3E}">
-        <p14:creationId xmlns:p14="http://schemas.microsoft.com/office/powerpoint/2010/main" val="2901158269"/>
+        <p14:creationId xmlns:p14="http://schemas.microsoft.com/office/powerpoint/2010/main" val="3458135603"/>
       </p:ext>
     </p:extLst>
   </p:cSld>
@@ -3123,7 +3320,11 @@
           <a:bodyPr/>
           <a:lstStyle/>
           <a:p>
-            <a:endParaRPr lang="hu-HU"/>
+            <a:pPr algn="ctr"/>
+            <a:r>
+              <a:rPr lang="hu-HU" dirty="0"/>
+              <a:t>Előnyök</a:t>
+            </a:r>
           </a:p>
         </p:txBody>
       </p:sp>
@@ -3134,22 +3335,103 @@
             <a:spLocks noGrp="1"/>
           </p:cNvSpPr>
           <p:nvPr>
-            <p:ph idx="1"/>
-          </p:nvPr>
-        </p:nvSpPr>
-        <p:spPr/>
-        <p:txBody>
-          <a:bodyPr/>
-          <a:lstStyle/>
-          <a:p>
-            <a:endParaRPr lang="hu-HU"/>
+            <p:ph sz="half" idx="1"/>
+          </p:nvPr>
+        </p:nvSpPr>
+        <p:spPr/>
+        <p:txBody>
+          <a:bodyPr/>
+          <a:lstStyle/>
+          <a:p>
+            <a:r>
+              <a:rPr lang="hu-HU" dirty="0" smtClean="0"/>
+              <a:t>Bővíthető memória</a:t>
+            </a:r>
+          </a:p>
+          <a:p>
+            <a:r>
+              <a:rPr lang="hu-HU" dirty="0" smtClean="0"/>
+              <a:t>Testreszabhatóság</a:t>
+            </a:r>
+          </a:p>
+          <a:p>
+            <a:r>
+              <a:rPr lang="hu-HU" dirty="0" smtClean="0"/>
+              <a:t>Szívósság</a:t>
+            </a:r>
+          </a:p>
+          <a:p>
+            <a:r>
+              <a:rPr lang="hu-HU" dirty="0" smtClean="0"/>
+              <a:t>4K videók</a:t>
+            </a:r>
+          </a:p>
+          <a:p>
+            <a:r>
+              <a:rPr lang="hu-HU" dirty="0" smtClean="0"/>
+              <a:t>Lehet víz- és porálló is</a:t>
+            </a:r>
+          </a:p>
+          <a:p>
+            <a:endParaRPr lang="hu-HU" dirty="0"/>
+          </a:p>
+        </p:txBody>
+      </p:sp>
+      <p:sp>
+        <p:nvSpPr>
+          <p:cNvPr id="4" name="Tartalom helye 3"/>
+          <p:cNvSpPr>
+            <a:spLocks noGrp="1"/>
+          </p:cNvSpPr>
+          <p:nvPr>
+            <p:ph sz="half" idx="2"/>
+          </p:nvPr>
+        </p:nvSpPr>
+        <p:spPr/>
+        <p:txBody>
+          <a:bodyPr/>
+          <a:lstStyle/>
+          <a:p>
+            <a:r>
+              <a:rPr lang="hu-HU" dirty="0" smtClean="0"/>
+              <a:t>Alkalmazások elérhetősége</a:t>
+            </a:r>
+          </a:p>
+          <a:p>
+            <a:r>
+              <a:rPr lang="hu-HU" dirty="0" smtClean="0"/>
+              <a:t>Gyors frissítés</a:t>
+            </a:r>
+          </a:p>
+          <a:p>
+            <a:r>
+              <a:rPr lang="hu-HU" dirty="0" smtClean="0"/>
+              <a:t>Széleskörű kompatibilitás</a:t>
+            </a:r>
+          </a:p>
+          <a:p>
+            <a:r>
+              <a:rPr lang="hu-HU" dirty="0" err="1" smtClean="0"/>
+              <a:t>Optimalizáltabb</a:t>
+            </a:r>
+            <a:r>
+              <a:rPr lang="hu-HU" dirty="0" smtClean="0"/>
+              <a:t> rendszer</a:t>
+            </a:r>
+          </a:p>
+          <a:p>
+            <a:r>
+              <a:rPr lang="hu-HU" dirty="0" smtClean="0"/>
+              <a:t>Biztonságosabb</a:t>
+            </a:r>
+            <a:endParaRPr lang="hu-HU" dirty="0"/>
           </a:p>
         </p:txBody>
       </p:sp>
     </p:spTree>
     <p:extLst>
       <p:ext uri="{BB962C8B-B14F-4D97-AF65-F5344CB8AC3E}">
-        <p14:creationId xmlns:p14="http://schemas.microsoft.com/office/powerpoint/2010/main" val="2838667945"/>
+        <p14:creationId xmlns:p14="http://schemas.microsoft.com/office/powerpoint/2010/main" val="2098855958"/>
       </p:ext>
     </p:extLst>
   </p:cSld>
@@ -3191,7 +3473,12 @@
           <a:bodyPr/>
           <a:lstStyle/>
           <a:p>
-            <a:endParaRPr lang="hu-HU"/>
+            <a:pPr algn="ctr"/>
+            <a:r>
+              <a:rPr lang="hu-HU" dirty="0" smtClean="0"/>
+              <a:t>Hátrányok</a:t>
+            </a:r>
+            <a:endParaRPr lang="hu-HU" dirty="0"/>
           </a:p>
         </p:txBody>
       </p:sp>
@@ -3259,7 +3546,32 @@
           <a:bodyPr/>
           <a:lstStyle/>
           <a:p>
-            <a:endParaRPr lang="hu-HU"/>
+            <a:pPr algn="ctr"/>
+            <a:r>
+              <a:rPr lang="hu-HU" dirty="0" smtClean="0"/>
+              <a:t>Miben jobb az </a:t>
+            </a:r>
+            <a:r>
+              <a:rPr lang="hu-HU" dirty="0" err="1"/>
+              <a:t>A</a:t>
+            </a:r>
+            <a:r>
+              <a:rPr lang="hu-HU" dirty="0" err="1" smtClean="0"/>
+              <a:t>ndroid</a:t>
+            </a:r>
+            <a:r>
+              <a:rPr lang="hu-HU" dirty="0" smtClean="0"/>
+              <a:t> mint az </a:t>
+            </a:r>
+            <a:r>
+              <a:rPr lang="hu-HU" dirty="0" err="1" smtClean="0"/>
+              <a:t>iOS</a:t>
+            </a:r>
+            <a:r>
+              <a:rPr lang="hu-HU" dirty="0" smtClean="0"/>
+              <a:t>?</a:t>
+            </a:r>
+            <a:endParaRPr lang="hu-HU" dirty="0"/>
           </a:p>
         </p:txBody>
       </p:sp>
@@ -3278,7 +3590,29 @@
           <a:bodyPr/>
           <a:lstStyle/>
           <a:p>
-            <a:endParaRPr lang="hu-HU"/>
+            <a:r>
+              <a:rPr lang="hu-HU" dirty="0" smtClean="0"/>
+              <a:t>Ár</a:t>
+            </a:r>
+          </a:p>
+          <a:p>
+            <a:r>
+              <a:rPr lang="hu-HU" dirty="0" smtClean="0"/>
+              <a:t>C-</a:t>
+            </a:r>
+            <a:r>
+              <a:rPr lang="hu-HU" dirty="0" err="1" smtClean="0"/>
+              <a:t>Type</a:t>
+            </a:r>
+            <a:r>
+              <a:rPr lang="hu-HU" dirty="0" smtClean="0"/>
+              <a:t> </a:t>
+            </a:r>
+            <a:r>
+              <a:rPr lang="hu-HU" smtClean="0"/>
+              <a:t>töltő gyorstöltésre</a:t>
+            </a:r>
+            <a:endParaRPr lang="hu-HU" dirty="0" smtClean="0"/>
           </a:p>
         </p:txBody>
       </p:sp>
@@ -3327,7 +3661,28 @@
           <a:bodyPr/>
           <a:lstStyle/>
           <a:p>
-            <a:endParaRPr lang="hu-HU"/>
+            <a:pPr algn="ctr"/>
+            <a:r>
+              <a:rPr lang="hu-HU" dirty="0" smtClean="0"/>
+              <a:t>Miben jobb az </a:t>
+            </a:r>
+            <a:r>
+              <a:rPr lang="hu-HU" dirty="0" err="1" smtClean="0"/>
+              <a:t>iOS</a:t>
+            </a:r>
+            <a:r>
+              <a:rPr lang="hu-HU" dirty="0" smtClean="0"/>
+              <a:t>, mint az </a:t>
+            </a:r>
+            <a:r>
+              <a:rPr lang="hu-HU" dirty="0" err="1" smtClean="0"/>
+              <a:t>Android</a:t>
+            </a:r>
+            <a:r>
+              <a:rPr lang="hu-HU" dirty="0" smtClean="0"/>
+              <a:t>?</a:t>
+            </a:r>
+            <a:endParaRPr lang="hu-HU" dirty="0"/>
           </a:p>
         </p:txBody>
       </p:sp>
@@ -3492,7 +3847,56 @@
           <a:bodyPr/>
           <a:lstStyle/>
           <a:p>
-            <a:endParaRPr lang="hu-HU"/>
+            <a:r>
+              <a:rPr lang="hu-HU" dirty="0">
+                <a:hlinkClick r:id="rId2"/>
+              </a:rPr>
+              <a:t>https://</a:t>
+            </a:r>
+            <a:r>
+              <a:rPr lang="hu-HU" dirty="0" smtClean="0">
+                <a:hlinkClick r:id="rId2"/>
+              </a:rPr>
+              <a:t>hu.wikipedia.org/wiki/Android-verzi%C3%B3k</a:t>
+            </a:r>
+            <a:endParaRPr lang="hu-HU" dirty="0" smtClean="0"/>
+          </a:p>
+          <a:p>
+            <a:r>
+              <a:rPr lang="hu-HU" dirty="0">
+                <a:hlinkClick r:id="rId3"/>
+              </a:rPr>
+              <a:t>https://</a:t>
+            </a:r>
+            <a:r>
+              <a:rPr lang="hu-HU" dirty="0" smtClean="0">
+                <a:hlinkClick r:id="rId3"/>
+              </a:rPr>
+              <a:t>hu.wikipedia.org/wiki/IOS</a:t>
+            </a:r>
+            <a:endParaRPr lang="hu-HU" dirty="0" smtClean="0"/>
+          </a:p>
+          <a:p>
+            <a:r>
+              <a:rPr lang="hu-HU" dirty="0">
+                <a:hlinkClick r:id="rId4"/>
+              </a:rPr>
+              <a:t>https://</a:t>
+            </a:r>
+            <a:r>
+              <a:rPr lang="hu-HU" dirty="0" smtClean="0">
+                <a:hlinkClick r:id="rId4"/>
+              </a:rPr>
+              <a:t>landcomputer.blog.hu/2020/10/12/5_dolog_amiben_jobb_az_ios_az_androidnal</a:t>
+            </a:r>
+            <a:endParaRPr lang="hu-HU" dirty="0" smtClean="0"/>
+          </a:p>
+          <a:p>
+            <a:r>
+              <a:rPr lang="hu-HU" dirty="0"/>
+              <a:t>https://smartclinic.hu/hu/blog/10-dolog-ami-miatt-android-jobb-mint-iphone/</a:t>
+            </a:r>
+            <a:endParaRPr lang="hu-HU" dirty="0" smtClean="0"/>
           </a:p>
         </p:txBody>
       </p:sp>

</xml_diff>

<commit_message>
órai feladat commitolása, már csak animáció kell
</commit_message>
<xml_diff>
--- a/ikt powerpoint.pptx
+++ b/ikt powerpoint.pptx
@@ -8,7 +8,7 @@
     <p:sldId id="256" r:id="rId2"/>
     <p:sldId id="265" r:id="rId3"/>
     <p:sldId id="266" r:id="rId4"/>
-    <p:sldId id="263" r:id="rId5"/>
+    <p:sldId id="267" r:id="rId5"/>
     <p:sldId id="264" r:id="rId6"/>
     <p:sldId id="257" r:id="rId7"/>
     <p:sldId id="258" r:id="rId8"/>
@@ -251,7 +251,7 @@
           <a:p>
             <a:fld id="{25A7EE50-FE4F-41FC-96A9-59C15C2B9FBA}" type="datetimeFigureOut">
               <a:rPr lang="hu-HU" smtClean="0"/>
-              <a:t>2022.09.14.</a:t>
+              <a:t>2022.09.15.</a:t>
             </a:fld>
             <a:endParaRPr lang="hu-HU"/>
           </a:p>
@@ -421,7 +421,7 @@
           <a:p>
             <a:fld id="{25A7EE50-FE4F-41FC-96A9-59C15C2B9FBA}" type="datetimeFigureOut">
               <a:rPr lang="hu-HU" smtClean="0"/>
-              <a:t>2022.09.14.</a:t>
+              <a:t>2022.09.15.</a:t>
             </a:fld>
             <a:endParaRPr lang="hu-HU"/>
           </a:p>
@@ -601,7 +601,7 @@
           <a:p>
             <a:fld id="{25A7EE50-FE4F-41FC-96A9-59C15C2B9FBA}" type="datetimeFigureOut">
               <a:rPr lang="hu-HU" smtClean="0"/>
-              <a:t>2022.09.14.</a:t>
+              <a:t>2022.09.15.</a:t>
             </a:fld>
             <a:endParaRPr lang="hu-HU"/>
           </a:p>
@@ -771,7 +771,7 @@
           <a:p>
             <a:fld id="{25A7EE50-FE4F-41FC-96A9-59C15C2B9FBA}" type="datetimeFigureOut">
               <a:rPr lang="hu-HU" smtClean="0"/>
-              <a:t>2022.09.14.</a:t>
+              <a:t>2022.09.15.</a:t>
             </a:fld>
             <a:endParaRPr lang="hu-HU"/>
           </a:p>
@@ -1017,7 +1017,7 @@
           <a:p>
             <a:fld id="{25A7EE50-FE4F-41FC-96A9-59C15C2B9FBA}" type="datetimeFigureOut">
               <a:rPr lang="hu-HU" smtClean="0"/>
-              <a:t>2022.09.14.</a:t>
+              <a:t>2022.09.15.</a:t>
             </a:fld>
             <a:endParaRPr lang="hu-HU"/>
           </a:p>
@@ -1249,7 +1249,7 @@
           <a:p>
             <a:fld id="{25A7EE50-FE4F-41FC-96A9-59C15C2B9FBA}" type="datetimeFigureOut">
               <a:rPr lang="hu-HU" smtClean="0"/>
-              <a:t>2022.09.14.</a:t>
+              <a:t>2022.09.15.</a:t>
             </a:fld>
             <a:endParaRPr lang="hu-HU"/>
           </a:p>
@@ -1616,7 +1616,7 @@
           <a:p>
             <a:fld id="{25A7EE50-FE4F-41FC-96A9-59C15C2B9FBA}" type="datetimeFigureOut">
               <a:rPr lang="hu-HU" smtClean="0"/>
-              <a:t>2022.09.14.</a:t>
+              <a:t>2022.09.15.</a:t>
             </a:fld>
             <a:endParaRPr lang="hu-HU"/>
           </a:p>
@@ -1734,7 +1734,7 @@
           <a:p>
             <a:fld id="{25A7EE50-FE4F-41FC-96A9-59C15C2B9FBA}" type="datetimeFigureOut">
               <a:rPr lang="hu-HU" smtClean="0"/>
-              <a:t>2022.09.14.</a:t>
+              <a:t>2022.09.15.</a:t>
             </a:fld>
             <a:endParaRPr lang="hu-HU"/>
           </a:p>
@@ -1829,7 +1829,7 @@
           <a:p>
             <a:fld id="{25A7EE50-FE4F-41FC-96A9-59C15C2B9FBA}" type="datetimeFigureOut">
               <a:rPr lang="hu-HU" smtClean="0"/>
-              <a:t>2022.09.14.</a:t>
+              <a:t>2022.09.15.</a:t>
             </a:fld>
             <a:endParaRPr lang="hu-HU"/>
           </a:p>
@@ -2106,7 +2106,7 @@
           <a:p>
             <a:fld id="{25A7EE50-FE4F-41FC-96A9-59C15C2B9FBA}" type="datetimeFigureOut">
               <a:rPr lang="hu-HU" smtClean="0"/>
-              <a:t>2022.09.14.</a:t>
+              <a:t>2022.09.15.</a:t>
             </a:fld>
             <a:endParaRPr lang="hu-HU"/>
           </a:p>
@@ -2359,7 +2359,7 @@
           <a:p>
             <a:fld id="{25A7EE50-FE4F-41FC-96A9-59C15C2B9FBA}" type="datetimeFigureOut">
               <a:rPr lang="hu-HU" smtClean="0"/>
-              <a:t>2022.09.14.</a:t>
+              <a:t>2022.09.15.</a:t>
             </a:fld>
             <a:endParaRPr lang="hu-HU"/>
           </a:p>
@@ -2572,7 +2572,7 @@
           <a:p>
             <a:fld id="{25A7EE50-FE4F-41FC-96A9-59C15C2B9FBA}" type="datetimeFigureOut">
               <a:rPr lang="hu-HU" smtClean="0"/>
-              <a:t>2022.09.14.</a:t>
+              <a:t>2022.09.15.</a:t>
             </a:fld>
             <a:endParaRPr lang="hu-HU"/>
           </a:p>
@@ -3055,6 +3055,13 @@
   <p:clrMapOvr>
     <a:masterClrMapping/>
   </p:clrMapOvr>
+  <p:timing>
+    <p:tnLst>
+      <p:par>
+        <p:cTn id="1" dur="indefinite" restart="never" nodeType="tmRoot"/>
+      </p:par>
+    </p:tnLst>
+  </p:timing>
 </p:sld>
 </file>
 
@@ -3144,8 +3151,13 @@
           <a:p>
             <a:r>
               <a:rPr lang="hu-HU" dirty="0" smtClean="0"/>
-              <a:t>Op. Rendszer: Unix szerű</a:t>
-            </a:r>
+              <a:t>Op. Rendszer: Unix </a:t>
+            </a:r>
+            <a:r>
+              <a:rPr lang="hu-HU" dirty="0" smtClean="0"/>
+              <a:t>szerű</a:t>
+            </a:r>
+            <a:endParaRPr lang="hu-HU" dirty="0" smtClean="0"/>
           </a:p>
           <a:p>
             <a:r>
@@ -3203,8 +3215,29 @@
           <a:p>
             <a:r>
               <a:rPr lang="hu-HU" dirty="0" smtClean="0"/>
-              <a:t>Op. Rendszer:</a:t>
-            </a:r>
+              <a:t>Op. Rendszer</a:t>
+            </a:r>
+            <a:r>
+              <a:rPr lang="hu-HU" dirty="0" smtClean="0"/>
+              <a:t>: Saját op. Rendszere van (</a:t>
+            </a:r>
+            <a:r>
+              <a:rPr lang="hu-HU" dirty="0" err="1" smtClean="0"/>
+              <a:t>iOS</a:t>
+            </a:r>
+            <a:r>
+              <a:rPr lang="hu-HU" dirty="0" smtClean="0"/>
+              <a:t> = i </a:t>
+            </a:r>
+            <a:r>
+              <a:rPr lang="hu-HU" dirty="0" err="1" smtClean="0"/>
+              <a:t>Operating</a:t>
+            </a:r>
+            <a:r>
+              <a:rPr lang="hu-HU" dirty="0" smtClean="0"/>
+              <a:t> System)</a:t>
+            </a:r>
+            <a:endParaRPr lang="hu-HU" dirty="0" smtClean="0"/>
           </a:p>
           <a:p>
             <a:r>
@@ -3285,6 +3318,878 @@
   <p:clrMapOvr>
     <a:masterClrMapping/>
   </p:clrMapOvr>
+  <p:timing>
+    <p:tnLst>
+      <p:par>
+        <p:cTn id="1" dur="indefinite" restart="never" nodeType="tmRoot">
+          <p:childTnLst>
+            <p:seq concurrent="1" nextAc="seek">
+              <p:cTn id="2" dur="indefinite" nodeType="mainSeq">
+                <p:childTnLst>
+                  <p:par>
+                    <p:cTn id="3" fill="hold">
+                      <p:stCondLst>
+                        <p:cond delay="indefinite"/>
+                      </p:stCondLst>
+                      <p:childTnLst>
+                        <p:par>
+                          <p:cTn id="4" fill="hold">
+                            <p:stCondLst>
+                              <p:cond delay="0"/>
+                            </p:stCondLst>
+                            <p:childTnLst>
+                              <p:par>
+                                <p:cTn id="5" presetID="2" presetClass="entr" presetSubtype="4" fill="hold" grpId="0" nodeType="clickEffect">
+                                  <p:stCondLst>
+                                    <p:cond delay="0"/>
+                                  </p:stCondLst>
+                                  <p:childTnLst>
+                                    <p:set>
+                                      <p:cBhvr>
+                                        <p:cTn id="6" dur="1" fill="hold">
+                                          <p:stCondLst>
+                                            <p:cond delay="0"/>
+                                          </p:stCondLst>
+                                        </p:cTn>
+                                        <p:tgtEl>
+                                          <p:spTgt spid="3">
+                                            <p:txEl>
+                                              <p:pRg st="0" end="0"/>
+                                            </p:txEl>
+                                          </p:spTgt>
+                                        </p:tgtEl>
+                                        <p:attrNameLst>
+                                          <p:attrName>style.visibility</p:attrName>
+                                        </p:attrNameLst>
+                                      </p:cBhvr>
+                                      <p:to>
+                                        <p:strVal val="visible"/>
+                                      </p:to>
+                                    </p:set>
+                                    <p:anim calcmode="lin" valueType="num">
+                                      <p:cBhvr additive="base">
+                                        <p:cTn id="7" dur="500" fill="hold"/>
+                                        <p:tgtEl>
+                                          <p:spTgt spid="3">
+                                            <p:txEl>
+                                              <p:pRg st="0" end="0"/>
+                                            </p:txEl>
+                                          </p:spTgt>
+                                        </p:tgtEl>
+                                        <p:attrNameLst>
+                                          <p:attrName>ppt_x</p:attrName>
+                                        </p:attrNameLst>
+                                      </p:cBhvr>
+                                      <p:tavLst>
+                                        <p:tav tm="0">
+                                          <p:val>
+                                            <p:strVal val="#ppt_x"/>
+                                          </p:val>
+                                        </p:tav>
+                                        <p:tav tm="100000">
+                                          <p:val>
+                                            <p:strVal val="#ppt_x"/>
+                                          </p:val>
+                                        </p:tav>
+                                      </p:tavLst>
+                                    </p:anim>
+                                    <p:anim calcmode="lin" valueType="num">
+                                      <p:cBhvr additive="base">
+                                        <p:cTn id="8" dur="500" fill="hold"/>
+                                        <p:tgtEl>
+                                          <p:spTgt spid="3">
+                                            <p:txEl>
+                                              <p:pRg st="0" end="0"/>
+                                            </p:txEl>
+                                          </p:spTgt>
+                                        </p:tgtEl>
+                                        <p:attrNameLst>
+                                          <p:attrName>ppt_y</p:attrName>
+                                        </p:attrNameLst>
+                                      </p:cBhvr>
+                                      <p:tavLst>
+                                        <p:tav tm="0">
+                                          <p:val>
+                                            <p:strVal val="1+#ppt_h/2"/>
+                                          </p:val>
+                                        </p:tav>
+                                        <p:tav tm="100000">
+                                          <p:val>
+                                            <p:strVal val="#ppt_y"/>
+                                          </p:val>
+                                        </p:tav>
+                                      </p:tavLst>
+                                    </p:anim>
+                                  </p:childTnLst>
+                                </p:cTn>
+                              </p:par>
+                            </p:childTnLst>
+                          </p:cTn>
+                        </p:par>
+                      </p:childTnLst>
+                    </p:cTn>
+                  </p:par>
+                  <p:par>
+                    <p:cTn id="9" fill="hold">
+                      <p:stCondLst>
+                        <p:cond delay="indefinite"/>
+                      </p:stCondLst>
+                      <p:childTnLst>
+                        <p:par>
+                          <p:cTn id="10" fill="hold">
+                            <p:stCondLst>
+                              <p:cond delay="0"/>
+                            </p:stCondLst>
+                            <p:childTnLst>
+                              <p:par>
+                                <p:cTn id="11" presetID="22" presetClass="entr" presetSubtype="4" fill="hold" grpId="0" nodeType="clickEffect">
+                                  <p:stCondLst>
+                                    <p:cond delay="0"/>
+                                  </p:stCondLst>
+                                  <p:childTnLst>
+                                    <p:set>
+                                      <p:cBhvr>
+                                        <p:cTn id="12" dur="1" fill="hold">
+                                          <p:stCondLst>
+                                            <p:cond delay="0"/>
+                                          </p:stCondLst>
+                                        </p:cTn>
+                                        <p:tgtEl>
+                                          <p:spTgt spid="3">
+                                            <p:txEl>
+                                              <p:pRg st="1" end="1"/>
+                                            </p:txEl>
+                                          </p:spTgt>
+                                        </p:tgtEl>
+                                        <p:attrNameLst>
+                                          <p:attrName>style.visibility</p:attrName>
+                                        </p:attrNameLst>
+                                      </p:cBhvr>
+                                      <p:to>
+                                        <p:strVal val="visible"/>
+                                      </p:to>
+                                    </p:set>
+                                    <p:animEffect transition="in" filter="wipe(down)">
+                                      <p:cBhvr>
+                                        <p:cTn id="13" dur="500"/>
+                                        <p:tgtEl>
+                                          <p:spTgt spid="3">
+                                            <p:txEl>
+                                              <p:pRg st="1" end="1"/>
+                                            </p:txEl>
+                                          </p:spTgt>
+                                        </p:tgtEl>
+                                      </p:cBhvr>
+                                    </p:animEffect>
+                                  </p:childTnLst>
+                                </p:cTn>
+                              </p:par>
+                            </p:childTnLst>
+                          </p:cTn>
+                        </p:par>
+                      </p:childTnLst>
+                    </p:cTn>
+                  </p:par>
+                  <p:par>
+                    <p:cTn id="14" fill="hold">
+                      <p:stCondLst>
+                        <p:cond delay="indefinite"/>
+                      </p:stCondLst>
+                      <p:childTnLst>
+                        <p:par>
+                          <p:cTn id="15" fill="hold">
+                            <p:stCondLst>
+                              <p:cond delay="0"/>
+                            </p:stCondLst>
+                            <p:childTnLst>
+                              <p:par>
+                                <p:cTn id="16" presetID="1" presetClass="entr" presetSubtype="0" fill="hold" grpId="0" nodeType="clickEffect">
+                                  <p:stCondLst>
+                                    <p:cond delay="0"/>
+                                  </p:stCondLst>
+                                  <p:childTnLst>
+                                    <p:set>
+                                      <p:cBhvr>
+                                        <p:cTn id="17" dur="1" fill="hold">
+                                          <p:stCondLst>
+                                            <p:cond delay="0"/>
+                                          </p:stCondLst>
+                                        </p:cTn>
+                                        <p:tgtEl>
+                                          <p:spTgt spid="3">
+                                            <p:txEl>
+                                              <p:pRg st="2" end="2"/>
+                                            </p:txEl>
+                                          </p:spTgt>
+                                        </p:tgtEl>
+                                        <p:attrNameLst>
+                                          <p:attrName>style.visibility</p:attrName>
+                                        </p:attrNameLst>
+                                      </p:cBhvr>
+                                      <p:to>
+                                        <p:strVal val="visible"/>
+                                      </p:to>
+                                    </p:set>
+                                  </p:childTnLst>
+                                </p:cTn>
+                              </p:par>
+                            </p:childTnLst>
+                          </p:cTn>
+                        </p:par>
+                      </p:childTnLst>
+                    </p:cTn>
+                  </p:par>
+                  <p:par>
+                    <p:cTn id="18" fill="hold">
+                      <p:stCondLst>
+                        <p:cond delay="indefinite"/>
+                      </p:stCondLst>
+                      <p:childTnLst>
+                        <p:par>
+                          <p:cTn id="19" fill="hold">
+                            <p:stCondLst>
+                              <p:cond delay="0"/>
+                            </p:stCondLst>
+                            <p:childTnLst>
+                              <p:par>
+                                <p:cTn id="20" presetID="2" presetClass="entr" presetSubtype="4" fill="hold" grpId="0" nodeType="clickEffect">
+                                  <p:stCondLst>
+                                    <p:cond delay="0"/>
+                                  </p:stCondLst>
+                                  <p:childTnLst>
+                                    <p:set>
+                                      <p:cBhvr>
+                                        <p:cTn id="21" dur="1" fill="hold">
+                                          <p:stCondLst>
+                                            <p:cond delay="0"/>
+                                          </p:stCondLst>
+                                        </p:cTn>
+                                        <p:tgtEl>
+                                          <p:spTgt spid="3">
+                                            <p:txEl>
+                                              <p:pRg st="3" end="3"/>
+                                            </p:txEl>
+                                          </p:spTgt>
+                                        </p:tgtEl>
+                                        <p:attrNameLst>
+                                          <p:attrName>style.visibility</p:attrName>
+                                        </p:attrNameLst>
+                                      </p:cBhvr>
+                                      <p:to>
+                                        <p:strVal val="visible"/>
+                                      </p:to>
+                                    </p:set>
+                                    <p:anim calcmode="lin" valueType="num">
+                                      <p:cBhvr additive="base">
+                                        <p:cTn id="22" dur="500" fill="hold"/>
+                                        <p:tgtEl>
+                                          <p:spTgt spid="3">
+                                            <p:txEl>
+                                              <p:pRg st="3" end="3"/>
+                                            </p:txEl>
+                                          </p:spTgt>
+                                        </p:tgtEl>
+                                        <p:attrNameLst>
+                                          <p:attrName>ppt_x</p:attrName>
+                                        </p:attrNameLst>
+                                      </p:cBhvr>
+                                      <p:tavLst>
+                                        <p:tav tm="0">
+                                          <p:val>
+                                            <p:strVal val="#ppt_x"/>
+                                          </p:val>
+                                        </p:tav>
+                                        <p:tav tm="100000">
+                                          <p:val>
+                                            <p:strVal val="#ppt_x"/>
+                                          </p:val>
+                                        </p:tav>
+                                      </p:tavLst>
+                                    </p:anim>
+                                    <p:anim calcmode="lin" valueType="num">
+                                      <p:cBhvr additive="base">
+                                        <p:cTn id="23" dur="500" fill="hold"/>
+                                        <p:tgtEl>
+                                          <p:spTgt spid="3">
+                                            <p:txEl>
+                                              <p:pRg st="3" end="3"/>
+                                            </p:txEl>
+                                          </p:spTgt>
+                                        </p:tgtEl>
+                                        <p:attrNameLst>
+                                          <p:attrName>ppt_y</p:attrName>
+                                        </p:attrNameLst>
+                                      </p:cBhvr>
+                                      <p:tavLst>
+                                        <p:tav tm="0">
+                                          <p:val>
+                                            <p:strVal val="1+#ppt_h/2"/>
+                                          </p:val>
+                                        </p:tav>
+                                        <p:tav tm="100000">
+                                          <p:val>
+                                            <p:strVal val="#ppt_y"/>
+                                          </p:val>
+                                        </p:tav>
+                                      </p:tavLst>
+                                    </p:anim>
+                                  </p:childTnLst>
+                                </p:cTn>
+                              </p:par>
+                            </p:childTnLst>
+                          </p:cTn>
+                        </p:par>
+                      </p:childTnLst>
+                    </p:cTn>
+                  </p:par>
+                  <p:par>
+                    <p:cTn id="24" fill="hold">
+                      <p:stCondLst>
+                        <p:cond delay="indefinite"/>
+                      </p:stCondLst>
+                      <p:childTnLst>
+                        <p:par>
+                          <p:cTn id="25" fill="hold">
+                            <p:stCondLst>
+                              <p:cond delay="0"/>
+                            </p:stCondLst>
+                            <p:childTnLst>
+                              <p:par>
+                                <p:cTn id="26" presetID="2" presetClass="entr" presetSubtype="4" fill="hold" grpId="0" nodeType="clickEffect">
+                                  <p:stCondLst>
+                                    <p:cond delay="0"/>
+                                  </p:stCondLst>
+                                  <p:childTnLst>
+                                    <p:set>
+                                      <p:cBhvr>
+                                        <p:cTn id="27" dur="1" fill="hold">
+                                          <p:stCondLst>
+                                            <p:cond delay="0"/>
+                                          </p:stCondLst>
+                                        </p:cTn>
+                                        <p:tgtEl>
+                                          <p:spTgt spid="3">
+                                            <p:txEl>
+                                              <p:pRg st="4" end="4"/>
+                                            </p:txEl>
+                                          </p:spTgt>
+                                        </p:tgtEl>
+                                        <p:attrNameLst>
+                                          <p:attrName>style.visibility</p:attrName>
+                                        </p:attrNameLst>
+                                      </p:cBhvr>
+                                      <p:to>
+                                        <p:strVal val="visible"/>
+                                      </p:to>
+                                    </p:set>
+                                    <p:anim calcmode="lin" valueType="num">
+                                      <p:cBhvr additive="base">
+                                        <p:cTn id="28" dur="500" fill="hold"/>
+                                        <p:tgtEl>
+                                          <p:spTgt spid="3">
+                                            <p:txEl>
+                                              <p:pRg st="4" end="4"/>
+                                            </p:txEl>
+                                          </p:spTgt>
+                                        </p:tgtEl>
+                                        <p:attrNameLst>
+                                          <p:attrName>ppt_x</p:attrName>
+                                        </p:attrNameLst>
+                                      </p:cBhvr>
+                                      <p:tavLst>
+                                        <p:tav tm="0">
+                                          <p:val>
+                                            <p:strVal val="#ppt_x"/>
+                                          </p:val>
+                                        </p:tav>
+                                        <p:tav tm="100000">
+                                          <p:val>
+                                            <p:strVal val="#ppt_x"/>
+                                          </p:val>
+                                        </p:tav>
+                                      </p:tavLst>
+                                    </p:anim>
+                                    <p:anim calcmode="lin" valueType="num">
+                                      <p:cBhvr additive="base">
+                                        <p:cTn id="29" dur="500" fill="hold"/>
+                                        <p:tgtEl>
+                                          <p:spTgt spid="3">
+                                            <p:txEl>
+                                              <p:pRg st="4" end="4"/>
+                                            </p:txEl>
+                                          </p:spTgt>
+                                        </p:tgtEl>
+                                        <p:attrNameLst>
+                                          <p:attrName>ppt_y</p:attrName>
+                                        </p:attrNameLst>
+                                      </p:cBhvr>
+                                      <p:tavLst>
+                                        <p:tav tm="0">
+                                          <p:val>
+                                            <p:strVal val="1+#ppt_h/2"/>
+                                          </p:val>
+                                        </p:tav>
+                                        <p:tav tm="100000">
+                                          <p:val>
+                                            <p:strVal val="#ppt_y"/>
+                                          </p:val>
+                                        </p:tav>
+                                      </p:tavLst>
+                                    </p:anim>
+                                  </p:childTnLst>
+                                </p:cTn>
+                              </p:par>
+                            </p:childTnLst>
+                          </p:cTn>
+                        </p:par>
+                      </p:childTnLst>
+                    </p:cTn>
+                  </p:par>
+                  <p:par>
+                    <p:cTn id="30" fill="hold">
+                      <p:stCondLst>
+                        <p:cond delay="indefinite"/>
+                      </p:stCondLst>
+                      <p:childTnLst>
+                        <p:par>
+                          <p:cTn id="31" fill="hold">
+                            <p:stCondLst>
+                              <p:cond delay="0"/>
+                            </p:stCondLst>
+                            <p:childTnLst>
+                              <p:par>
+                                <p:cTn id="32" presetID="2" presetClass="entr" presetSubtype="4" fill="hold" grpId="0" nodeType="clickEffect">
+                                  <p:stCondLst>
+                                    <p:cond delay="0"/>
+                                  </p:stCondLst>
+                                  <p:childTnLst>
+                                    <p:set>
+                                      <p:cBhvr>
+                                        <p:cTn id="33" dur="1" fill="hold">
+                                          <p:stCondLst>
+                                            <p:cond delay="0"/>
+                                          </p:stCondLst>
+                                        </p:cTn>
+                                        <p:tgtEl>
+                                          <p:spTgt spid="4">
+                                            <p:txEl>
+                                              <p:pRg st="0" end="0"/>
+                                            </p:txEl>
+                                          </p:spTgt>
+                                        </p:tgtEl>
+                                        <p:attrNameLst>
+                                          <p:attrName>style.visibility</p:attrName>
+                                        </p:attrNameLst>
+                                      </p:cBhvr>
+                                      <p:to>
+                                        <p:strVal val="visible"/>
+                                      </p:to>
+                                    </p:set>
+                                    <p:anim calcmode="lin" valueType="num">
+                                      <p:cBhvr additive="base">
+                                        <p:cTn id="34" dur="500" fill="hold"/>
+                                        <p:tgtEl>
+                                          <p:spTgt spid="4">
+                                            <p:txEl>
+                                              <p:pRg st="0" end="0"/>
+                                            </p:txEl>
+                                          </p:spTgt>
+                                        </p:tgtEl>
+                                        <p:attrNameLst>
+                                          <p:attrName>ppt_x</p:attrName>
+                                        </p:attrNameLst>
+                                      </p:cBhvr>
+                                      <p:tavLst>
+                                        <p:tav tm="0">
+                                          <p:val>
+                                            <p:strVal val="#ppt_x"/>
+                                          </p:val>
+                                        </p:tav>
+                                        <p:tav tm="100000">
+                                          <p:val>
+                                            <p:strVal val="#ppt_x"/>
+                                          </p:val>
+                                        </p:tav>
+                                      </p:tavLst>
+                                    </p:anim>
+                                    <p:anim calcmode="lin" valueType="num">
+                                      <p:cBhvr additive="base">
+                                        <p:cTn id="35" dur="500" fill="hold"/>
+                                        <p:tgtEl>
+                                          <p:spTgt spid="4">
+                                            <p:txEl>
+                                              <p:pRg st="0" end="0"/>
+                                            </p:txEl>
+                                          </p:spTgt>
+                                        </p:tgtEl>
+                                        <p:attrNameLst>
+                                          <p:attrName>ppt_y</p:attrName>
+                                        </p:attrNameLst>
+                                      </p:cBhvr>
+                                      <p:tavLst>
+                                        <p:tav tm="0">
+                                          <p:val>
+                                            <p:strVal val="1+#ppt_h/2"/>
+                                          </p:val>
+                                        </p:tav>
+                                        <p:tav tm="100000">
+                                          <p:val>
+                                            <p:strVal val="#ppt_y"/>
+                                          </p:val>
+                                        </p:tav>
+                                      </p:tavLst>
+                                    </p:anim>
+                                  </p:childTnLst>
+                                </p:cTn>
+                              </p:par>
+                            </p:childTnLst>
+                          </p:cTn>
+                        </p:par>
+                      </p:childTnLst>
+                    </p:cTn>
+                  </p:par>
+                  <p:par>
+                    <p:cTn id="36" fill="hold">
+                      <p:stCondLst>
+                        <p:cond delay="indefinite"/>
+                      </p:stCondLst>
+                      <p:childTnLst>
+                        <p:par>
+                          <p:cTn id="37" fill="hold">
+                            <p:stCondLst>
+                              <p:cond delay="0"/>
+                            </p:stCondLst>
+                            <p:childTnLst>
+                              <p:par>
+                                <p:cTn id="38" presetID="22" presetClass="entr" presetSubtype="4" fill="hold" grpId="0" nodeType="clickEffect">
+                                  <p:stCondLst>
+                                    <p:cond delay="0"/>
+                                  </p:stCondLst>
+                                  <p:childTnLst>
+                                    <p:set>
+                                      <p:cBhvr>
+                                        <p:cTn id="39" dur="1" fill="hold">
+                                          <p:stCondLst>
+                                            <p:cond delay="0"/>
+                                          </p:stCondLst>
+                                        </p:cTn>
+                                        <p:tgtEl>
+                                          <p:spTgt spid="4">
+                                            <p:txEl>
+                                              <p:pRg st="1" end="1"/>
+                                            </p:txEl>
+                                          </p:spTgt>
+                                        </p:tgtEl>
+                                        <p:attrNameLst>
+                                          <p:attrName>style.visibility</p:attrName>
+                                        </p:attrNameLst>
+                                      </p:cBhvr>
+                                      <p:to>
+                                        <p:strVal val="visible"/>
+                                      </p:to>
+                                    </p:set>
+                                    <p:animEffect transition="in" filter="wipe(down)">
+                                      <p:cBhvr>
+                                        <p:cTn id="40" dur="500"/>
+                                        <p:tgtEl>
+                                          <p:spTgt spid="4">
+                                            <p:txEl>
+                                              <p:pRg st="1" end="1"/>
+                                            </p:txEl>
+                                          </p:spTgt>
+                                        </p:tgtEl>
+                                      </p:cBhvr>
+                                    </p:animEffect>
+                                  </p:childTnLst>
+                                </p:cTn>
+                              </p:par>
+                            </p:childTnLst>
+                          </p:cTn>
+                        </p:par>
+                      </p:childTnLst>
+                    </p:cTn>
+                  </p:par>
+                  <p:par>
+                    <p:cTn id="41" fill="hold">
+                      <p:stCondLst>
+                        <p:cond delay="indefinite"/>
+                      </p:stCondLst>
+                      <p:childTnLst>
+                        <p:par>
+                          <p:cTn id="42" fill="hold">
+                            <p:stCondLst>
+                              <p:cond delay="0"/>
+                            </p:stCondLst>
+                            <p:childTnLst>
+                              <p:par>
+                                <p:cTn id="43" presetID="1" presetClass="entr" presetSubtype="0" fill="hold" grpId="0" nodeType="clickEffect">
+                                  <p:stCondLst>
+                                    <p:cond delay="0"/>
+                                  </p:stCondLst>
+                                  <p:childTnLst>
+                                    <p:set>
+                                      <p:cBhvr>
+                                        <p:cTn id="44" dur="1" fill="hold">
+                                          <p:stCondLst>
+                                            <p:cond delay="0"/>
+                                          </p:stCondLst>
+                                        </p:cTn>
+                                        <p:tgtEl>
+                                          <p:spTgt spid="4">
+                                            <p:txEl>
+                                              <p:pRg st="2" end="2"/>
+                                            </p:txEl>
+                                          </p:spTgt>
+                                        </p:tgtEl>
+                                        <p:attrNameLst>
+                                          <p:attrName>style.visibility</p:attrName>
+                                        </p:attrNameLst>
+                                      </p:cBhvr>
+                                      <p:to>
+                                        <p:strVal val="visible"/>
+                                      </p:to>
+                                    </p:set>
+                                  </p:childTnLst>
+                                </p:cTn>
+                              </p:par>
+                            </p:childTnLst>
+                          </p:cTn>
+                        </p:par>
+                      </p:childTnLst>
+                    </p:cTn>
+                  </p:par>
+                  <p:par>
+                    <p:cTn id="45" fill="hold">
+                      <p:stCondLst>
+                        <p:cond delay="indefinite"/>
+                      </p:stCondLst>
+                      <p:childTnLst>
+                        <p:par>
+                          <p:cTn id="46" fill="hold">
+                            <p:stCondLst>
+                              <p:cond delay="0"/>
+                            </p:stCondLst>
+                            <p:childTnLst>
+                              <p:par>
+                                <p:cTn id="47" presetID="2" presetClass="entr" presetSubtype="4" fill="hold" grpId="0" nodeType="clickEffect">
+                                  <p:stCondLst>
+                                    <p:cond delay="0"/>
+                                  </p:stCondLst>
+                                  <p:childTnLst>
+                                    <p:set>
+                                      <p:cBhvr>
+                                        <p:cTn id="48" dur="1" fill="hold">
+                                          <p:stCondLst>
+                                            <p:cond delay="0"/>
+                                          </p:stCondLst>
+                                        </p:cTn>
+                                        <p:tgtEl>
+                                          <p:spTgt spid="4">
+                                            <p:txEl>
+                                              <p:pRg st="3" end="3"/>
+                                            </p:txEl>
+                                          </p:spTgt>
+                                        </p:tgtEl>
+                                        <p:attrNameLst>
+                                          <p:attrName>style.visibility</p:attrName>
+                                        </p:attrNameLst>
+                                      </p:cBhvr>
+                                      <p:to>
+                                        <p:strVal val="visible"/>
+                                      </p:to>
+                                    </p:set>
+                                    <p:anim calcmode="lin" valueType="num">
+                                      <p:cBhvr additive="base">
+                                        <p:cTn id="49" dur="500" fill="hold"/>
+                                        <p:tgtEl>
+                                          <p:spTgt spid="4">
+                                            <p:txEl>
+                                              <p:pRg st="3" end="3"/>
+                                            </p:txEl>
+                                          </p:spTgt>
+                                        </p:tgtEl>
+                                        <p:attrNameLst>
+                                          <p:attrName>ppt_x</p:attrName>
+                                        </p:attrNameLst>
+                                      </p:cBhvr>
+                                      <p:tavLst>
+                                        <p:tav tm="0">
+                                          <p:val>
+                                            <p:strVal val="#ppt_x"/>
+                                          </p:val>
+                                        </p:tav>
+                                        <p:tav tm="100000">
+                                          <p:val>
+                                            <p:strVal val="#ppt_x"/>
+                                          </p:val>
+                                        </p:tav>
+                                      </p:tavLst>
+                                    </p:anim>
+                                    <p:anim calcmode="lin" valueType="num">
+                                      <p:cBhvr additive="base">
+                                        <p:cTn id="50" dur="500" fill="hold"/>
+                                        <p:tgtEl>
+                                          <p:spTgt spid="4">
+                                            <p:txEl>
+                                              <p:pRg st="3" end="3"/>
+                                            </p:txEl>
+                                          </p:spTgt>
+                                        </p:tgtEl>
+                                        <p:attrNameLst>
+                                          <p:attrName>ppt_y</p:attrName>
+                                        </p:attrNameLst>
+                                      </p:cBhvr>
+                                      <p:tavLst>
+                                        <p:tav tm="0">
+                                          <p:val>
+                                            <p:strVal val="1+#ppt_h/2"/>
+                                          </p:val>
+                                        </p:tav>
+                                        <p:tav tm="100000">
+                                          <p:val>
+                                            <p:strVal val="#ppt_y"/>
+                                          </p:val>
+                                        </p:tav>
+                                      </p:tavLst>
+                                    </p:anim>
+                                  </p:childTnLst>
+                                </p:cTn>
+                              </p:par>
+                            </p:childTnLst>
+                          </p:cTn>
+                        </p:par>
+                      </p:childTnLst>
+                    </p:cTn>
+                  </p:par>
+                  <p:par>
+                    <p:cTn id="51" fill="hold">
+                      <p:stCondLst>
+                        <p:cond delay="indefinite"/>
+                      </p:stCondLst>
+                      <p:childTnLst>
+                        <p:par>
+                          <p:cTn id="52" fill="hold">
+                            <p:stCondLst>
+                              <p:cond delay="0"/>
+                            </p:stCondLst>
+                            <p:childTnLst>
+                              <p:par>
+                                <p:cTn id="53" presetID="2" presetClass="entr" presetSubtype="4" fill="hold" grpId="0" nodeType="clickEffect">
+                                  <p:stCondLst>
+                                    <p:cond delay="0"/>
+                                  </p:stCondLst>
+                                  <p:childTnLst>
+                                    <p:set>
+                                      <p:cBhvr>
+                                        <p:cTn id="54" dur="1" fill="hold">
+                                          <p:stCondLst>
+                                            <p:cond delay="0"/>
+                                          </p:stCondLst>
+                                        </p:cTn>
+                                        <p:tgtEl>
+                                          <p:spTgt spid="4">
+                                            <p:txEl>
+                                              <p:pRg st="4" end="4"/>
+                                            </p:txEl>
+                                          </p:spTgt>
+                                        </p:tgtEl>
+                                        <p:attrNameLst>
+                                          <p:attrName>style.visibility</p:attrName>
+                                        </p:attrNameLst>
+                                      </p:cBhvr>
+                                      <p:to>
+                                        <p:strVal val="visible"/>
+                                      </p:to>
+                                    </p:set>
+                                    <p:anim calcmode="lin" valueType="num">
+                                      <p:cBhvr additive="base">
+                                        <p:cTn id="55" dur="500" fill="hold"/>
+                                        <p:tgtEl>
+                                          <p:spTgt spid="4">
+                                            <p:txEl>
+                                              <p:pRg st="4" end="4"/>
+                                            </p:txEl>
+                                          </p:spTgt>
+                                        </p:tgtEl>
+                                        <p:attrNameLst>
+                                          <p:attrName>ppt_x</p:attrName>
+                                        </p:attrNameLst>
+                                      </p:cBhvr>
+                                      <p:tavLst>
+                                        <p:tav tm="0">
+                                          <p:val>
+                                            <p:strVal val="#ppt_x"/>
+                                          </p:val>
+                                        </p:tav>
+                                        <p:tav tm="100000">
+                                          <p:val>
+                                            <p:strVal val="#ppt_x"/>
+                                          </p:val>
+                                        </p:tav>
+                                      </p:tavLst>
+                                    </p:anim>
+                                    <p:anim calcmode="lin" valueType="num">
+                                      <p:cBhvr additive="base">
+                                        <p:cTn id="56" dur="500" fill="hold"/>
+                                        <p:tgtEl>
+                                          <p:spTgt spid="4">
+                                            <p:txEl>
+                                              <p:pRg st="4" end="4"/>
+                                            </p:txEl>
+                                          </p:spTgt>
+                                        </p:tgtEl>
+                                        <p:attrNameLst>
+                                          <p:attrName>ppt_y</p:attrName>
+                                        </p:attrNameLst>
+                                      </p:cBhvr>
+                                      <p:tavLst>
+                                        <p:tav tm="0">
+                                          <p:val>
+                                            <p:strVal val="1+#ppt_h/2"/>
+                                          </p:val>
+                                        </p:tav>
+                                        <p:tav tm="100000">
+                                          <p:val>
+                                            <p:strVal val="#ppt_y"/>
+                                          </p:val>
+                                        </p:tav>
+                                      </p:tavLst>
+                                    </p:anim>
+                                  </p:childTnLst>
+                                </p:cTn>
+                              </p:par>
+                            </p:childTnLst>
+                          </p:cTn>
+                        </p:par>
+                      </p:childTnLst>
+                    </p:cTn>
+                  </p:par>
+                </p:childTnLst>
+              </p:cTn>
+              <p:prevCondLst>
+                <p:cond evt="onPrev" delay="0">
+                  <p:tgtEl>
+                    <p:sldTgt/>
+                  </p:tgtEl>
+                </p:cond>
+              </p:prevCondLst>
+              <p:nextCondLst>
+                <p:cond evt="onNext" delay="0">
+                  <p:tgtEl>
+                    <p:sldTgt/>
+                  </p:tgtEl>
+                </p:cond>
+              </p:nextCondLst>
+            </p:seq>
+          </p:childTnLst>
+        </p:cTn>
+      </p:par>
+    </p:tnLst>
+    <p:bldLst>
+      <p:bldP spid="3" grpId="0" build="p"/>
+      <p:bldP spid="4" grpId="0" build="p"/>
+    </p:bldLst>
+  </p:timing>
 </p:sld>
 </file>
 
@@ -3424,7 +4329,6 @@
               <a:rPr lang="hu-HU" dirty="0" smtClean="0"/>
               <a:t>Biztonságosabb</a:t>
             </a:r>
-            <a:endParaRPr lang="hu-HU" dirty="0"/>
           </a:p>
         </p:txBody>
       </p:sp>
@@ -3438,6 +4342,13 @@
   <p:clrMapOvr>
     <a:masterClrMapping/>
   </p:clrMapOvr>
+  <p:timing>
+    <p:tnLst>
+      <p:par>
+        <p:cTn id="1" dur="indefinite" restart="never" nodeType="tmRoot"/>
+      </p:par>
+    </p:tnLst>
+  </p:timing>
 </p:sld>
 </file>
 
@@ -3475,42 +4386,202 @@
           <a:p>
             <a:pPr algn="ctr"/>
             <a:r>
+              <a:rPr lang="hu-HU" dirty="0"/>
+              <a:t>Hátrányok</a:t>
+            </a:r>
+          </a:p>
+        </p:txBody>
+      </p:sp>
+      <p:sp>
+        <p:nvSpPr>
+          <p:cNvPr id="3" name="Tartalom helye 2"/>
+          <p:cNvSpPr>
+            <a:spLocks noGrp="1"/>
+          </p:cNvSpPr>
+          <p:nvPr>
+            <p:ph sz="half" idx="1"/>
+          </p:nvPr>
+        </p:nvSpPr>
+        <p:spPr/>
+        <p:txBody>
+          <a:bodyPr>
+            <a:normAutofit fontScale="92500"/>
+          </a:bodyPr>
+          <a:lstStyle/>
+          <a:p>
+            <a:r>
               <a:rPr lang="hu-HU" dirty="0" smtClean="0"/>
-              <a:t>Hátrányok</a:t>
-            </a:r>
+              <a:t>Alig kap frissítést, pár frissítés után lecserélik</a:t>
+            </a:r>
+          </a:p>
+          <a:p>
+            <a:r>
+              <a:rPr lang="hu-HU" dirty="0" smtClean="0"/>
+              <a:t>Google fiók nélkülözhetetlen</a:t>
+            </a:r>
+          </a:p>
+          <a:p>
+            <a:r>
+              <a:rPr lang="hu-HU" dirty="0" smtClean="0"/>
+              <a:t>Lassan fut a rendszer gyengébb eszközökön</a:t>
+            </a:r>
+          </a:p>
+          <a:p>
+            <a:r>
+              <a:rPr lang="hu-HU" dirty="0" smtClean="0"/>
+              <a:t>Az applikációk futnak a háttérben, emiatt lassul a telefon</a:t>
+            </a:r>
+          </a:p>
+          <a:p>
+            <a:r>
+              <a:rPr lang="hu-HU" dirty="0" smtClean="0"/>
+              <a:t>Nincs prémium vírus védelem</a:t>
+            </a:r>
+          </a:p>
+          <a:p>
+            <a:endParaRPr lang="hu-HU" dirty="0" smtClean="0"/>
+          </a:p>
+          <a:p>
+            <a:endParaRPr lang="hu-HU" dirty="0" smtClean="0"/>
+          </a:p>
+        </p:txBody>
+      </p:sp>
+      <p:sp>
+        <p:nvSpPr>
+          <p:cNvPr id="4" name="Tartalom helye 3"/>
+          <p:cNvSpPr>
+            <a:spLocks noGrp="1"/>
+          </p:cNvSpPr>
+          <p:nvPr>
+            <p:ph sz="half" idx="2"/>
+          </p:nvPr>
+        </p:nvSpPr>
+        <p:spPr/>
+        <p:txBody>
+          <a:bodyPr>
+            <a:normAutofit fontScale="92500"/>
+          </a:bodyPr>
+          <a:lstStyle/>
+          <a:p>
+            <a:r>
+              <a:rPr lang="hu-HU" dirty="0" smtClean="0"/>
+              <a:t>Az akkumulátor hamar lemerül</a:t>
+            </a:r>
+          </a:p>
+          <a:p>
+            <a:r>
+              <a:rPr lang="hu-HU" dirty="0" smtClean="0"/>
+              <a:t>Ugyanazok az ikonok maradnak frissítés után, minimális változtatásokat kap csak</a:t>
+            </a:r>
+          </a:p>
+          <a:p>
+            <a:r>
+              <a:rPr lang="hu-HU" dirty="0" smtClean="0"/>
+              <a:t>Nem lehet </a:t>
+            </a:r>
+            <a:r>
+              <a:rPr lang="hu-HU" dirty="0" err="1" smtClean="0"/>
+              <a:t>testreszabni</a:t>
+            </a:r>
+            <a:endParaRPr lang="hu-HU" dirty="0" smtClean="0"/>
+          </a:p>
+          <a:p>
+            <a:r>
+              <a:rPr lang="hu-HU" dirty="0" smtClean="0"/>
+              <a:t>Nem lehet bővíteni a memóriát / tárhelyet</a:t>
+            </a:r>
+          </a:p>
+          <a:p>
+            <a:r>
+              <a:rPr lang="hu-HU" dirty="0" smtClean="0"/>
+              <a:t>Nem támogatja az NFC (</a:t>
+            </a:r>
+            <a:r>
+              <a:rPr lang="hu-HU" dirty="0" err="1"/>
+              <a:t>Near</a:t>
+            </a:r>
+            <a:r>
+              <a:rPr lang="hu-HU" dirty="0"/>
+              <a:t> </a:t>
+            </a:r>
+            <a:r>
+              <a:rPr lang="hu-HU" dirty="0" err="1"/>
+              <a:t>Field</a:t>
+            </a:r>
+            <a:r>
+              <a:rPr lang="hu-HU" dirty="0"/>
+              <a:t> </a:t>
+            </a:r>
+            <a:r>
+              <a:rPr lang="hu-HU" dirty="0" err="1" smtClean="0"/>
+              <a:t>Communication</a:t>
+            </a:r>
+            <a:r>
+              <a:rPr lang="hu-HU" dirty="0" smtClean="0"/>
+              <a:t>-t) és a rádiót</a:t>
+            </a:r>
+          </a:p>
+          <a:p>
+            <a:r>
+              <a:rPr lang="hu-HU" dirty="0" smtClean="0"/>
+              <a:t>Rendszeres túlmelegedés</a:t>
+            </a:r>
+          </a:p>
+          <a:p>
+            <a:endParaRPr lang="hu-HU" dirty="0" smtClean="0"/>
+          </a:p>
+          <a:p>
             <a:endParaRPr lang="hu-HU" dirty="0"/>
           </a:p>
         </p:txBody>
       </p:sp>
-      <p:sp>
-        <p:nvSpPr>
-          <p:cNvPr id="3" name="Tartalom helye 2"/>
-          <p:cNvSpPr>
-            <a:spLocks noGrp="1"/>
-          </p:cNvSpPr>
-          <p:nvPr>
-            <p:ph idx="1"/>
-          </p:nvPr>
-        </p:nvSpPr>
-        <p:spPr/>
-        <p:txBody>
-          <a:bodyPr/>
-          <a:lstStyle/>
-          <a:p>
-            <a:endParaRPr lang="hu-HU"/>
-          </a:p>
-        </p:txBody>
-      </p:sp>
+      <p:pic>
+        <p:nvPicPr>
+          <p:cNvPr id="5" name="Kép 4"/>
+          <p:cNvPicPr>
+            <a:picLocks noChangeAspect="1"/>
+          </p:cNvPicPr>
+          <p:nvPr/>
+        </p:nvPicPr>
+        <p:blipFill>
+          <a:blip r:embed="rId2">
+            <a:extLst>
+              <a:ext uri="{28A0092B-C50C-407E-A947-70E740481C1C}">
+                <a14:useLocalDpi xmlns:a14="http://schemas.microsoft.com/office/drawing/2010/main" val="0"/>
+              </a:ext>
+            </a:extLst>
+          </a:blip>
+          <a:stretch>
+            <a:fillRect/>
+          </a:stretch>
+        </p:blipFill>
+        <p:spPr>
+          <a:xfrm>
+            <a:off x="9935853" y="5594557"/>
+            <a:ext cx="2256148" cy="1263443"/>
+          </a:xfrm>
+          <a:prstGeom prst="rect">
+            <a:avLst/>
+          </a:prstGeom>
+        </p:spPr>
+      </p:pic>
     </p:spTree>
     <p:extLst>
       <p:ext uri="{BB962C8B-B14F-4D97-AF65-F5344CB8AC3E}">
-        <p14:creationId xmlns:p14="http://schemas.microsoft.com/office/powerpoint/2010/main" val="4189896236"/>
+        <p14:creationId xmlns:p14="http://schemas.microsoft.com/office/powerpoint/2010/main" val="1705758398"/>
       </p:ext>
     </p:extLst>
   </p:cSld>
   <p:clrMapOvr>
     <a:masterClrMapping/>
   </p:clrMapOvr>
+  <p:timing>
+    <p:tnLst>
+      <p:par>
+        <p:cTn id="1" dur="indefinite" restart="never" nodeType="tmRoot"/>
+      </p:par>
+    </p:tnLst>
+  </p:timing>
 </p:sld>
 </file>
 
@@ -3592,7 +4663,7 @@
           <a:p>
             <a:r>
               <a:rPr lang="hu-HU" dirty="0" smtClean="0"/>
-              <a:t>Ár</a:t>
+              <a:t>Elviselhetőbb az ára</a:t>
             </a:r>
           </a:p>
           <a:p>
@@ -3609,9 +4680,72 @@
               <a:t> </a:t>
             </a:r>
             <a:r>
-              <a:rPr lang="hu-HU" smtClean="0"/>
-              <a:t>töltő gyorstöltésre</a:t>
-            </a:r>
+              <a:rPr lang="hu-HU" dirty="0" smtClean="0"/>
+              <a:t>töltő </a:t>
+            </a:r>
+            <a:r>
+              <a:rPr lang="hu-HU" dirty="0" smtClean="0"/>
+              <a:t>gyorstöltésre</a:t>
+            </a:r>
+          </a:p>
+          <a:p>
+            <a:r>
+              <a:rPr lang="hu-HU" dirty="0" smtClean="0"/>
+              <a:t>Jobb testreszabhatóság</a:t>
+            </a:r>
+          </a:p>
+          <a:p>
+            <a:r>
+              <a:rPr lang="hu-HU" dirty="0" smtClean="0"/>
+              <a:t>Jobb kamera videók ill. </a:t>
+            </a:r>
+            <a:r>
+              <a:rPr lang="hu-HU" dirty="0" smtClean="0"/>
+              <a:t>fénykép készítésre</a:t>
+            </a:r>
+          </a:p>
+          <a:p>
+            <a:r>
+              <a:rPr lang="hu-HU" dirty="0" smtClean="0"/>
+              <a:t>Több az ingyenes alkalmazás</a:t>
+            </a:r>
+          </a:p>
+          <a:p>
+            <a:r>
+              <a:rPr lang="hu-HU" dirty="0" smtClean="0"/>
+              <a:t>Bővíthető memória (pl. </a:t>
+            </a:r>
+            <a:r>
+              <a:rPr lang="hu-HU" dirty="0" err="1" smtClean="0"/>
+              <a:t>micro</a:t>
+            </a:r>
+            <a:r>
+              <a:rPr lang="hu-HU" dirty="0" smtClean="0"/>
+              <a:t> SD kártya)</a:t>
+            </a:r>
+          </a:p>
+          <a:p>
+            <a:r>
+              <a:rPr lang="hu-HU" dirty="0" smtClean="0"/>
+              <a:t>Az akkumulátor tovább bírja</a:t>
+            </a:r>
+          </a:p>
+          <a:p>
+            <a:pPr marL="0" indent="0">
+              <a:buNone/>
+            </a:pPr>
+            <a:endParaRPr lang="hu-HU" dirty="0" smtClean="0"/>
+          </a:p>
+          <a:p>
+            <a:pPr marL="0" indent="0">
+              <a:buNone/>
+            </a:pPr>
+            <a:endParaRPr lang="hu-HU" dirty="0" smtClean="0"/>
+          </a:p>
+          <a:p>
+            <a:endParaRPr lang="hu-HU" dirty="0" smtClean="0"/>
+          </a:p>
+          <a:p>
             <a:endParaRPr lang="hu-HU" dirty="0" smtClean="0"/>
           </a:p>
         </p:txBody>
@@ -3626,6 +4760,760 @@
   <p:clrMapOvr>
     <a:masterClrMapping/>
   </p:clrMapOvr>
+  <p:timing>
+    <p:tnLst>
+      <p:par>
+        <p:cTn id="1" dur="indefinite" restart="never" nodeType="tmRoot">
+          <p:childTnLst>
+            <p:seq concurrent="1" nextAc="seek">
+              <p:cTn id="2" dur="indefinite" nodeType="mainSeq">
+                <p:childTnLst>
+                  <p:par>
+                    <p:cTn id="3" fill="hold">
+                      <p:stCondLst>
+                        <p:cond delay="indefinite"/>
+                      </p:stCondLst>
+                      <p:childTnLst>
+                        <p:par>
+                          <p:cTn id="4" fill="hold">
+                            <p:stCondLst>
+                              <p:cond delay="0"/>
+                            </p:stCondLst>
+                            <p:childTnLst>
+                              <p:par>
+                                <p:cTn id="5" presetID="2" presetClass="entr" presetSubtype="4" fill="hold" grpId="0" nodeType="clickEffect">
+                                  <p:stCondLst>
+                                    <p:cond delay="0"/>
+                                  </p:stCondLst>
+                                  <p:childTnLst>
+                                    <p:set>
+                                      <p:cBhvr>
+                                        <p:cTn id="6" dur="1" fill="hold">
+                                          <p:stCondLst>
+                                            <p:cond delay="0"/>
+                                          </p:stCondLst>
+                                        </p:cTn>
+                                        <p:tgtEl>
+                                          <p:spTgt spid="3">
+                                            <p:txEl>
+                                              <p:pRg st="0" end="0"/>
+                                            </p:txEl>
+                                          </p:spTgt>
+                                        </p:tgtEl>
+                                        <p:attrNameLst>
+                                          <p:attrName>style.visibility</p:attrName>
+                                        </p:attrNameLst>
+                                      </p:cBhvr>
+                                      <p:to>
+                                        <p:strVal val="visible"/>
+                                      </p:to>
+                                    </p:set>
+                                    <p:anim calcmode="lin" valueType="num">
+                                      <p:cBhvr additive="base">
+                                        <p:cTn id="7" dur="500" fill="hold"/>
+                                        <p:tgtEl>
+                                          <p:spTgt spid="3">
+                                            <p:txEl>
+                                              <p:pRg st="0" end="0"/>
+                                            </p:txEl>
+                                          </p:spTgt>
+                                        </p:tgtEl>
+                                        <p:attrNameLst>
+                                          <p:attrName>ppt_x</p:attrName>
+                                        </p:attrNameLst>
+                                      </p:cBhvr>
+                                      <p:tavLst>
+                                        <p:tav tm="0">
+                                          <p:val>
+                                            <p:strVal val="#ppt_x"/>
+                                          </p:val>
+                                        </p:tav>
+                                        <p:tav tm="100000">
+                                          <p:val>
+                                            <p:strVal val="#ppt_x"/>
+                                          </p:val>
+                                        </p:tav>
+                                      </p:tavLst>
+                                    </p:anim>
+                                    <p:anim calcmode="lin" valueType="num">
+                                      <p:cBhvr additive="base">
+                                        <p:cTn id="8" dur="500" fill="hold"/>
+                                        <p:tgtEl>
+                                          <p:spTgt spid="3">
+                                            <p:txEl>
+                                              <p:pRg st="0" end="0"/>
+                                            </p:txEl>
+                                          </p:spTgt>
+                                        </p:tgtEl>
+                                        <p:attrNameLst>
+                                          <p:attrName>ppt_y</p:attrName>
+                                        </p:attrNameLst>
+                                      </p:cBhvr>
+                                      <p:tavLst>
+                                        <p:tav tm="0">
+                                          <p:val>
+                                            <p:strVal val="1+#ppt_h/2"/>
+                                          </p:val>
+                                        </p:tav>
+                                        <p:tav tm="100000">
+                                          <p:val>
+                                            <p:strVal val="#ppt_y"/>
+                                          </p:val>
+                                        </p:tav>
+                                      </p:tavLst>
+                                    </p:anim>
+                                  </p:childTnLst>
+                                </p:cTn>
+                              </p:par>
+                            </p:childTnLst>
+                          </p:cTn>
+                        </p:par>
+                      </p:childTnLst>
+                    </p:cTn>
+                  </p:par>
+                  <p:par>
+                    <p:cTn id="9" fill="hold">
+                      <p:stCondLst>
+                        <p:cond delay="indefinite"/>
+                      </p:stCondLst>
+                      <p:childTnLst>
+                        <p:par>
+                          <p:cTn id="10" fill="hold">
+                            <p:stCondLst>
+                              <p:cond delay="0"/>
+                            </p:stCondLst>
+                            <p:childTnLst>
+                              <p:par>
+                                <p:cTn id="11" presetID="2" presetClass="entr" presetSubtype="4" fill="hold" grpId="0" nodeType="clickEffect">
+                                  <p:stCondLst>
+                                    <p:cond delay="0"/>
+                                  </p:stCondLst>
+                                  <p:childTnLst>
+                                    <p:set>
+                                      <p:cBhvr>
+                                        <p:cTn id="12" dur="1" fill="hold">
+                                          <p:stCondLst>
+                                            <p:cond delay="0"/>
+                                          </p:stCondLst>
+                                        </p:cTn>
+                                        <p:tgtEl>
+                                          <p:spTgt spid="3">
+                                            <p:txEl>
+                                              <p:pRg st="1" end="1"/>
+                                            </p:txEl>
+                                          </p:spTgt>
+                                        </p:tgtEl>
+                                        <p:attrNameLst>
+                                          <p:attrName>style.visibility</p:attrName>
+                                        </p:attrNameLst>
+                                      </p:cBhvr>
+                                      <p:to>
+                                        <p:strVal val="visible"/>
+                                      </p:to>
+                                    </p:set>
+                                    <p:anim calcmode="lin" valueType="num">
+                                      <p:cBhvr additive="base">
+                                        <p:cTn id="13" dur="500" fill="hold"/>
+                                        <p:tgtEl>
+                                          <p:spTgt spid="3">
+                                            <p:txEl>
+                                              <p:pRg st="1" end="1"/>
+                                            </p:txEl>
+                                          </p:spTgt>
+                                        </p:tgtEl>
+                                        <p:attrNameLst>
+                                          <p:attrName>ppt_x</p:attrName>
+                                        </p:attrNameLst>
+                                      </p:cBhvr>
+                                      <p:tavLst>
+                                        <p:tav tm="0">
+                                          <p:val>
+                                            <p:strVal val="#ppt_x"/>
+                                          </p:val>
+                                        </p:tav>
+                                        <p:tav tm="100000">
+                                          <p:val>
+                                            <p:strVal val="#ppt_x"/>
+                                          </p:val>
+                                        </p:tav>
+                                      </p:tavLst>
+                                    </p:anim>
+                                    <p:anim calcmode="lin" valueType="num">
+                                      <p:cBhvr additive="base">
+                                        <p:cTn id="14" dur="500" fill="hold"/>
+                                        <p:tgtEl>
+                                          <p:spTgt spid="3">
+                                            <p:txEl>
+                                              <p:pRg st="1" end="1"/>
+                                            </p:txEl>
+                                          </p:spTgt>
+                                        </p:tgtEl>
+                                        <p:attrNameLst>
+                                          <p:attrName>ppt_y</p:attrName>
+                                        </p:attrNameLst>
+                                      </p:cBhvr>
+                                      <p:tavLst>
+                                        <p:tav tm="0">
+                                          <p:val>
+                                            <p:strVal val="1+#ppt_h/2"/>
+                                          </p:val>
+                                        </p:tav>
+                                        <p:tav tm="100000">
+                                          <p:val>
+                                            <p:strVal val="#ppt_y"/>
+                                          </p:val>
+                                        </p:tav>
+                                      </p:tavLst>
+                                    </p:anim>
+                                  </p:childTnLst>
+                                </p:cTn>
+                              </p:par>
+                            </p:childTnLst>
+                          </p:cTn>
+                        </p:par>
+                      </p:childTnLst>
+                    </p:cTn>
+                  </p:par>
+                  <p:par>
+                    <p:cTn id="15" fill="hold">
+                      <p:stCondLst>
+                        <p:cond delay="indefinite"/>
+                      </p:stCondLst>
+                      <p:childTnLst>
+                        <p:par>
+                          <p:cTn id="16" fill="hold">
+                            <p:stCondLst>
+                              <p:cond delay="0"/>
+                            </p:stCondLst>
+                            <p:childTnLst>
+                              <p:par>
+                                <p:cTn id="17" presetID="2" presetClass="entr" presetSubtype="4" fill="hold" grpId="0" nodeType="clickEffect">
+                                  <p:stCondLst>
+                                    <p:cond delay="0"/>
+                                  </p:stCondLst>
+                                  <p:childTnLst>
+                                    <p:set>
+                                      <p:cBhvr>
+                                        <p:cTn id="18" dur="1" fill="hold">
+                                          <p:stCondLst>
+                                            <p:cond delay="0"/>
+                                          </p:stCondLst>
+                                        </p:cTn>
+                                        <p:tgtEl>
+                                          <p:spTgt spid="3">
+                                            <p:txEl>
+                                              <p:pRg st="2" end="2"/>
+                                            </p:txEl>
+                                          </p:spTgt>
+                                        </p:tgtEl>
+                                        <p:attrNameLst>
+                                          <p:attrName>style.visibility</p:attrName>
+                                        </p:attrNameLst>
+                                      </p:cBhvr>
+                                      <p:to>
+                                        <p:strVal val="visible"/>
+                                      </p:to>
+                                    </p:set>
+                                    <p:anim calcmode="lin" valueType="num">
+                                      <p:cBhvr additive="base">
+                                        <p:cTn id="19" dur="500" fill="hold"/>
+                                        <p:tgtEl>
+                                          <p:spTgt spid="3">
+                                            <p:txEl>
+                                              <p:pRg st="2" end="2"/>
+                                            </p:txEl>
+                                          </p:spTgt>
+                                        </p:tgtEl>
+                                        <p:attrNameLst>
+                                          <p:attrName>ppt_x</p:attrName>
+                                        </p:attrNameLst>
+                                      </p:cBhvr>
+                                      <p:tavLst>
+                                        <p:tav tm="0">
+                                          <p:val>
+                                            <p:strVal val="#ppt_x"/>
+                                          </p:val>
+                                        </p:tav>
+                                        <p:tav tm="100000">
+                                          <p:val>
+                                            <p:strVal val="#ppt_x"/>
+                                          </p:val>
+                                        </p:tav>
+                                      </p:tavLst>
+                                    </p:anim>
+                                    <p:anim calcmode="lin" valueType="num">
+                                      <p:cBhvr additive="base">
+                                        <p:cTn id="20" dur="500" fill="hold"/>
+                                        <p:tgtEl>
+                                          <p:spTgt spid="3">
+                                            <p:txEl>
+                                              <p:pRg st="2" end="2"/>
+                                            </p:txEl>
+                                          </p:spTgt>
+                                        </p:tgtEl>
+                                        <p:attrNameLst>
+                                          <p:attrName>ppt_y</p:attrName>
+                                        </p:attrNameLst>
+                                      </p:cBhvr>
+                                      <p:tavLst>
+                                        <p:tav tm="0">
+                                          <p:val>
+                                            <p:strVal val="1+#ppt_h/2"/>
+                                          </p:val>
+                                        </p:tav>
+                                        <p:tav tm="100000">
+                                          <p:val>
+                                            <p:strVal val="#ppt_y"/>
+                                          </p:val>
+                                        </p:tav>
+                                      </p:tavLst>
+                                    </p:anim>
+                                  </p:childTnLst>
+                                </p:cTn>
+                              </p:par>
+                            </p:childTnLst>
+                          </p:cTn>
+                        </p:par>
+                      </p:childTnLst>
+                    </p:cTn>
+                  </p:par>
+                  <p:par>
+                    <p:cTn id="21" fill="hold">
+                      <p:stCondLst>
+                        <p:cond delay="indefinite"/>
+                      </p:stCondLst>
+                      <p:childTnLst>
+                        <p:par>
+                          <p:cTn id="22" fill="hold">
+                            <p:stCondLst>
+                              <p:cond delay="0"/>
+                            </p:stCondLst>
+                            <p:childTnLst>
+                              <p:par>
+                                <p:cTn id="23" presetID="2" presetClass="entr" presetSubtype="4" fill="hold" grpId="0" nodeType="clickEffect">
+                                  <p:stCondLst>
+                                    <p:cond delay="0"/>
+                                  </p:stCondLst>
+                                  <p:childTnLst>
+                                    <p:set>
+                                      <p:cBhvr>
+                                        <p:cTn id="24" dur="1" fill="hold">
+                                          <p:stCondLst>
+                                            <p:cond delay="0"/>
+                                          </p:stCondLst>
+                                        </p:cTn>
+                                        <p:tgtEl>
+                                          <p:spTgt spid="3">
+                                            <p:txEl>
+                                              <p:pRg st="3" end="3"/>
+                                            </p:txEl>
+                                          </p:spTgt>
+                                        </p:tgtEl>
+                                        <p:attrNameLst>
+                                          <p:attrName>style.visibility</p:attrName>
+                                        </p:attrNameLst>
+                                      </p:cBhvr>
+                                      <p:to>
+                                        <p:strVal val="visible"/>
+                                      </p:to>
+                                    </p:set>
+                                    <p:anim calcmode="lin" valueType="num">
+                                      <p:cBhvr additive="base">
+                                        <p:cTn id="25" dur="500" fill="hold"/>
+                                        <p:tgtEl>
+                                          <p:spTgt spid="3">
+                                            <p:txEl>
+                                              <p:pRg st="3" end="3"/>
+                                            </p:txEl>
+                                          </p:spTgt>
+                                        </p:tgtEl>
+                                        <p:attrNameLst>
+                                          <p:attrName>ppt_x</p:attrName>
+                                        </p:attrNameLst>
+                                      </p:cBhvr>
+                                      <p:tavLst>
+                                        <p:tav tm="0">
+                                          <p:val>
+                                            <p:strVal val="#ppt_x"/>
+                                          </p:val>
+                                        </p:tav>
+                                        <p:tav tm="100000">
+                                          <p:val>
+                                            <p:strVal val="#ppt_x"/>
+                                          </p:val>
+                                        </p:tav>
+                                      </p:tavLst>
+                                    </p:anim>
+                                    <p:anim calcmode="lin" valueType="num">
+                                      <p:cBhvr additive="base">
+                                        <p:cTn id="26" dur="500" fill="hold"/>
+                                        <p:tgtEl>
+                                          <p:spTgt spid="3">
+                                            <p:txEl>
+                                              <p:pRg st="3" end="3"/>
+                                            </p:txEl>
+                                          </p:spTgt>
+                                        </p:tgtEl>
+                                        <p:attrNameLst>
+                                          <p:attrName>ppt_y</p:attrName>
+                                        </p:attrNameLst>
+                                      </p:cBhvr>
+                                      <p:tavLst>
+                                        <p:tav tm="0">
+                                          <p:val>
+                                            <p:strVal val="1+#ppt_h/2"/>
+                                          </p:val>
+                                        </p:tav>
+                                        <p:tav tm="100000">
+                                          <p:val>
+                                            <p:strVal val="#ppt_y"/>
+                                          </p:val>
+                                        </p:tav>
+                                      </p:tavLst>
+                                    </p:anim>
+                                  </p:childTnLst>
+                                </p:cTn>
+                              </p:par>
+                            </p:childTnLst>
+                          </p:cTn>
+                        </p:par>
+                      </p:childTnLst>
+                    </p:cTn>
+                  </p:par>
+                  <p:par>
+                    <p:cTn id="27" fill="hold">
+                      <p:stCondLst>
+                        <p:cond delay="indefinite"/>
+                      </p:stCondLst>
+                      <p:childTnLst>
+                        <p:par>
+                          <p:cTn id="28" fill="hold">
+                            <p:stCondLst>
+                              <p:cond delay="0"/>
+                            </p:stCondLst>
+                            <p:childTnLst>
+                              <p:par>
+                                <p:cTn id="29" presetID="2" presetClass="entr" presetSubtype="4" fill="hold" grpId="0" nodeType="clickEffect">
+                                  <p:stCondLst>
+                                    <p:cond delay="0"/>
+                                  </p:stCondLst>
+                                  <p:childTnLst>
+                                    <p:set>
+                                      <p:cBhvr>
+                                        <p:cTn id="30" dur="1" fill="hold">
+                                          <p:stCondLst>
+                                            <p:cond delay="0"/>
+                                          </p:stCondLst>
+                                        </p:cTn>
+                                        <p:tgtEl>
+                                          <p:spTgt spid="3">
+                                            <p:txEl>
+                                              <p:pRg st="4" end="4"/>
+                                            </p:txEl>
+                                          </p:spTgt>
+                                        </p:tgtEl>
+                                        <p:attrNameLst>
+                                          <p:attrName>style.visibility</p:attrName>
+                                        </p:attrNameLst>
+                                      </p:cBhvr>
+                                      <p:to>
+                                        <p:strVal val="visible"/>
+                                      </p:to>
+                                    </p:set>
+                                    <p:anim calcmode="lin" valueType="num">
+                                      <p:cBhvr additive="base">
+                                        <p:cTn id="31" dur="500" fill="hold"/>
+                                        <p:tgtEl>
+                                          <p:spTgt spid="3">
+                                            <p:txEl>
+                                              <p:pRg st="4" end="4"/>
+                                            </p:txEl>
+                                          </p:spTgt>
+                                        </p:tgtEl>
+                                        <p:attrNameLst>
+                                          <p:attrName>ppt_x</p:attrName>
+                                        </p:attrNameLst>
+                                      </p:cBhvr>
+                                      <p:tavLst>
+                                        <p:tav tm="0">
+                                          <p:val>
+                                            <p:strVal val="#ppt_x"/>
+                                          </p:val>
+                                        </p:tav>
+                                        <p:tav tm="100000">
+                                          <p:val>
+                                            <p:strVal val="#ppt_x"/>
+                                          </p:val>
+                                        </p:tav>
+                                      </p:tavLst>
+                                    </p:anim>
+                                    <p:anim calcmode="lin" valueType="num">
+                                      <p:cBhvr additive="base">
+                                        <p:cTn id="32" dur="500" fill="hold"/>
+                                        <p:tgtEl>
+                                          <p:spTgt spid="3">
+                                            <p:txEl>
+                                              <p:pRg st="4" end="4"/>
+                                            </p:txEl>
+                                          </p:spTgt>
+                                        </p:tgtEl>
+                                        <p:attrNameLst>
+                                          <p:attrName>ppt_y</p:attrName>
+                                        </p:attrNameLst>
+                                      </p:cBhvr>
+                                      <p:tavLst>
+                                        <p:tav tm="0">
+                                          <p:val>
+                                            <p:strVal val="1+#ppt_h/2"/>
+                                          </p:val>
+                                        </p:tav>
+                                        <p:tav tm="100000">
+                                          <p:val>
+                                            <p:strVal val="#ppt_y"/>
+                                          </p:val>
+                                        </p:tav>
+                                      </p:tavLst>
+                                    </p:anim>
+                                  </p:childTnLst>
+                                </p:cTn>
+                              </p:par>
+                            </p:childTnLst>
+                          </p:cTn>
+                        </p:par>
+                      </p:childTnLst>
+                    </p:cTn>
+                  </p:par>
+                  <p:par>
+                    <p:cTn id="33" fill="hold">
+                      <p:stCondLst>
+                        <p:cond delay="indefinite"/>
+                      </p:stCondLst>
+                      <p:childTnLst>
+                        <p:par>
+                          <p:cTn id="34" fill="hold">
+                            <p:stCondLst>
+                              <p:cond delay="0"/>
+                            </p:stCondLst>
+                            <p:childTnLst>
+                              <p:par>
+                                <p:cTn id="35" presetID="2" presetClass="entr" presetSubtype="4" fill="hold" grpId="0" nodeType="clickEffect">
+                                  <p:stCondLst>
+                                    <p:cond delay="0"/>
+                                  </p:stCondLst>
+                                  <p:childTnLst>
+                                    <p:set>
+                                      <p:cBhvr>
+                                        <p:cTn id="36" dur="1" fill="hold">
+                                          <p:stCondLst>
+                                            <p:cond delay="0"/>
+                                          </p:stCondLst>
+                                        </p:cTn>
+                                        <p:tgtEl>
+                                          <p:spTgt spid="3">
+                                            <p:txEl>
+                                              <p:pRg st="5" end="5"/>
+                                            </p:txEl>
+                                          </p:spTgt>
+                                        </p:tgtEl>
+                                        <p:attrNameLst>
+                                          <p:attrName>style.visibility</p:attrName>
+                                        </p:attrNameLst>
+                                      </p:cBhvr>
+                                      <p:to>
+                                        <p:strVal val="visible"/>
+                                      </p:to>
+                                    </p:set>
+                                    <p:anim calcmode="lin" valueType="num">
+                                      <p:cBhvr additive="base">
+                                        <p:cTn id="37" dur="500" fill="hold"/>
+                                        <p:tgtEl>
+                                          <p:spTgt spid="3">
+                                            <p:txEl>
+                                              <p:pRg st="5" end="5"/>
+                                            </p:txEl>
+                                          </p:spTgt>
+                                        </p:tgtEl>
+                                        <p:attrNameLst>
+                                          <p:attrName>ppt_x</p:attrName>
+                                        </p:attrNameLst>
+                                      </p:cBhvr>
+                                      <p:tavLst>
+                                        <p:tav tm="0">
+                                          <p:val>
+                                            <p:strVal val="#ppt_x"/>
+                                          </p:val>
+                                        </p:tav>
+                                        <p:tav tm="100000">
+                                          <p:val>
+                                            <p:strVal val="#ppt_x"/>
+                                          </p:val>
+                                        </p:tav>
+                                      </p:tavLst>
+                                    </p:anim>
+                                    <p:anim calcmode="lin" valueType="num">
+                                      <p:cBhvr additive="base">
+                                        <p:cTn id="38" dur="500" fill="hold"/>
+                                        <p:tgtEl>
+                                          <p:spTgt spid="3">
+                                            <p:txEl>
+                                              <p:pRg st="5" end="5"/>
+                                            </p:txEl>
+                                          </p:spTgt>
+                                        </p:tgtEl>
+                                        <p:attrNameLst>
+                                          <p:attrName>ppt_y</p:attrName>
+                                        </p:attrNameLst>
+                                      </p:cBhvr>
+                                      <p:tavLst>
+                                        <p:tav tm="0">
+                                          <p:val>
+                                            <p:strVal val="1+#ppt_h/2"/>
+                                          </p:val>
+                                        </p:tav>
+                                        <p:tav tm="100000">
+                                          <p:val>
+                                            <p:strVal val="#ppt_y"/>
+                                          </p:val>
+                                        </p:tav>
+                                      </p:tavLst>
+                                    </p:anim>
+                                  </p:childTnLst>
+                                </p:cTn>
+                              </p:par>
+                            </p:childTnLst>
+                          </p:cTn>
+                        </p:par>
+                      </p:childTnLst>
+                    </p:cTn>
+                  </p:par>
+                  <p:par>
+                    <p:cTn id="39" fill="hold">
+                      <p:stCondLst>
+                        <p:cond delay="indefinite"/>
+                      </p:stCondLst>
+                      <p:childTnLst>
+                        <p:par>
+                          <p:cTn id="40" fill="hold">
+                            <p:stCondLst>
+                              <p:cond delay="0"/>
+                            </p:stCondLst>
+                            <p:childTnLst>
+                              <p:par>
+                                <p:cTn id="41" presetID="2" presetClass="entr" presetSubtype="4" fill="hold" grpId="0" nodeType="clickEffect">
+                                  <p:stCondLst>
+                                    <p:cond delay="0"/>
+                                  </p:stCondLst>
+                                  <p:childTnLst>
+                                    <p:set>
+                                      <p:cBhvr>
+                                        <p:cTn id="42" dur="1" fill="hold">
+                                          <p:stCondLst>
+                                            <p:cond delay="0"/>
+                                          </p:stCondLst>
+                                        </p:cTn>
+                                        <p:tgtEl>
+                                          <p:spTgt spid="3">
+                                            <p:txEl>
+                                              <p:pRg st="6" end="6"/>
+                                            </p:txEl>
+                                          </p:spTgt>
+                                        </p:tgtEl>
+                                        <p:attrNameLst>
+                                          <p:attrName>style.visibility</p:attrName>
+                                        </p:attrNameLst>
+                                      </p:cBhvr>
+                                      <p:to>
+                                        <p:strVal val="visible"/>
+                                      </p:to>
+                                    </p:set>
+                                    <p:anim calcmode="lin" valueType="num">
+                                      <p:cBhvr additive="base">
+                                        <p:cTn id="43" dur="500" fill="hold"/>
+                                        <p:tgtEl>
+                                          <p:spTgt spid="3">
+                                            <p:txEl>
+                                              <p:pRg st="6" end="6"/>
+                                            </p:txEl>
+                                          </p:spTgt>
+                                        </p:tgtEl>
+                                        <p:attrNameLst>
+                                          <p:attrName>ppt_x</p:attrName>
+                                        </p:attrNameLst>
+                                      </p:cBhvr>
+                                      <p:tavLst>
+                                        <p:tav tm="0">
+                                          <p:val>
+                                            <p:strVal val="#ppt_x"/>
+                                          </p:val>
+                                        </p:tav>
+                                        <p:tav tm="100000">
+                                          <p:val>
+                                            <p:strVal val="#ppt_x"/>
+                                          </p:val>
+                                        </p:tav>
+                                      </p:tavLst>
+                                    </p:anim>
+                                    <p:anim calcmode="lin" valueType="num">
+                                      <p:cBhvr additive="base">
+                                        <p:cTn id="44" dur="500" fill="hold"/>
+                                        <p:tgtEl>
+                                          <p:spTgt spid="3">
+                                            <p:txEl>
+                                              <p:pRg st="6" end="6"/>
+                                            </p:txEl>
+                                          </p:spTgt>
+                                        </p:tgtEl>
+                                        <p:attrNameLst>
+                                          <p:attrName>ppt_y</p:attrName>
+                                        </p:attrNameLst>
+                                      </p:cBhvr>
+                                      <p:tavLst>
+                                        <p:tav tm="0">
+                                          <p:val>
+                                            <p:strVal val="1+#ppt_h/2"/>
+                                          </p:val>
+                                        </p:tav>
+                                        <p:tav tm="100000">
+                                          <p:val>
+                                            <p:strVal val="#ppt_y"/>
+                                          </p:val>
+                                        </p:tav>
+                                      </p:tavLst>
+                                    </p:anim>
+                                  </p:childTnLst>
+                                </p:cTn>
+                              </p:par>
+                            </p:childTnLst>
+                          </p:cTn>
+                        </p:par>
+                      </p:childTnLst>
+                    </p:cTn>
+                  </p:par>
+                </p:childTnLst>
+              </p:cTn>
+              <p:prevCondLst>
+                <p:cond evt="onPrev" delay="0">
+                  <p:tgtEl>
+                    <p:sldTgt/>
+                  </p:tgtEl>
+                </p:cond>
+              </p:prevCondLst>
+              <p:nextCondLst>
+                <p:cond evt="onNext" delay="0">
+                  <p:tgtEl>
+                    <p:sldTgt/>
+                  </p:tgtEl>
+                </p:cond>
+              </p:nextCondLst>
+            </p:seq>
+          </p:childTnLst>
+        </p:cTn>
+      </p:par>
+    </p:tnLst>
+    <p:bldLst>
+      <p:bldP spid="3" grpId="0" build="p"/>
+    </p:bldLst>
+  </p:timing>
 </p:sld>
 </file>
 
@@ -3701,7 +5589,48 @@
           <a:bodyPr/>
           <a:lstStyle/>
           <a:p>
-            <a:endParaRPr lang="hu-HU"/>
+            <a:r>
+              <a:rPr lang="hu-HU" dirty="0" smtClean="0"/>
+              <a:t>Nincs </a:t>
+            </a:r>
+            <a:r>
+              <a:rPr lang="hu-HU" dirty="0" err="1" smtClean="0"/>
+              <a:t>Bloatware</a:t>
+            </a:r>
+            <a:r>
+              <a:rPr lang="hu-HU" dirty="0" smtClean="0"/>
+              <a:t> ami lassítaná az eszközt</a:t>
+            </a:r>
+          </a:p>
+          <a:p>
+            <a:r>
+              <a:rPr lang="hu-HU" dirty="0" smtClean="0"/>
+              <a:t>Könnyű használni</a:t>
+            </a:r>
+          </a:p>
+          <a:p>
+            <a:r>
+              <a:rPr lang="hu-HU" dirty="0" smtClean="0"/>
+              <a:t>Biztonságosabb a zárt forráskód miatt</a:t>
+            </a:r>
+          </a:p>
+          <a:p>
+            <a:r>
+              <a:rPr lang="hu-HU" dirty="0" smtClean="0"/>
+              <a:t>Teljesítmény</a:t>
+            </a:r>
+          </a:p>
+          <a:p>
+            <a:endParaRPr lang="hu-HU" dirty="0" smtClean="0"/>
+          </a:p>
+          <a:p>
+            <a:endParaRPr lang="hu-HU" dirty="0" smtClean="0"/>
+          </a:p>
+          <a:p>
+            <a:endParaRPr lang="hu-HU" dirty="0" smtClean="0"/>
+          </a:p>
+          <a:p>
+            <a:endParaRPr lang="hu-HU" dirty="0"/>
           </a:p>
         </p:txBody>
       </p:sp>
@@ -3715,6 +5644,13 @@
   <p:clrMapOvr>
     <a:masterClrMapping/>
   </p:clrMapOvr>
+  <p:timing>
+    <p:tnLst>
+      <p:par>
+        <p:cTn id="1" dur="indefinite" restart="never" nodeType="tmRoot"/>
+      </p:par>
+    </p:tnLst>
+  </p:timing>
 </p:sld>
 </file>
 
@@ -3783,6 +5719,13 @@
   <p:clrMapOvr>
     <a:masterClrMapping/>
   </p:clrMapOvr>
+  <p:timing>
+    <p:tnLst>
+      <p:par>
+        <p:cTn id="1" dur="indefinite" restart="never" nodeType="tmRoot"/>
+      </p:par>
+    </p:tnLst>
+  </p:timing>
 </p:sld>
 </file>
 
@@ -3815,7 +5758,7 @@
         </p:nvSpPr>
         <p:spPr>
           <a:xfrm>
-            <a:off x="838200" y="352425"/>
+            <a:off x="829887" y="0"/>
             <a:ext cx="10515600" cy="1325563"/>
           </a:xfrm>
         </p:spPr>
@@ -3842,60 +5785,180 @@
             <p:ph idx="1"/>
           </p:nvPr>
         </p:nvSpPr>
-        <p:spPr/>
-        <p:txBody>
-          <a:bodyPr/>
-          <a:lstStyle/>
-          <a:p>
-            <a:r>
-              <a:rPr lang="hu-HU" dirty="0">
+        <p:spPr>
+          <a:xfrm>
+            <a:off x="206432" y="844722"/>
+            <a:ext cx="11605953" cy="5506201"/>
+          </a:xfrm>
+        </p:spPr>
+        <p:txBody>
+          <a:bodyPr>
+            <a:normAutofit/>
+          </a:bodyPr>
+          <a:lstStyle/>
+          <a:p>
+            <a:r>
+              <a:rPr lang="hu-HU" sz="1600" dirty="0">
                 <a:hlinkClick r:id="rId2"/>
               </a:rPr>
               <a:t>https://</a:t>
             </a:r>
             <a:r>
-              <a:rPr lang="hu-HU" dirty="0" smtClean="0">
+              <a:rPr lang="hu-HU" sz="1600" dirty="0" smtClean="0">
                 <a:hlinkClick r:id="rId2"/>
               </a:rPr>
               <a:t>hu.wikipedia.org/wiki/Android-verzi%C3%B3k</a:t>
             </a:r>
-            <a:endParaRPr lang="hu-HU" dirty="0" smtClean="0"/>
-          </a:p>
-          <a:p>
-            <a:r>
-              <a:rPr lang="hu-HU" dirty="0">
+            <a:endParaRPr lang="hu-HU" sz="1600" dirty="0" smtClean="0"/>
+          </a:p>
+          <a:p>
+            <a:r>
+              <a:rPr lang="hu-HU" sz="1600" dirty="0">
                 <a:hlinkClick r:id="rId3"/>
               </a:rPr>
               <a:t>https://</a:t>
             </a:r>
             <a:r>
-              <a:rPr lang="hu-HU" dirty="0" smtClean="0">
+              <a:rPr lang="hu-HU" sz="1600" dirty="0" smtClean="0">
                 <a:hlinkClick r:id="rId3"/>
               </a:rPr>
               <a:t>hu.wikipedia.org/wiki/IOS</a:t>
             </a:r>
-            <a:endParaRPr lang="hu-HU" dirty="0" smtClean="0"/>
-          </a:p>
-          <a:p>
-            <a:r>
-              <a:rPr lang="hu-HU" dirty="0">
+            <a:endParaRPr lang="hu-HU" sz="1600" dirty="0" smtClean="0"/>
+          </a:p>
+          <a:p>
+            <a:r>
+              <a:rPr lang="hu-HU" sz="1600" dirty="0">
                 <a:hlinkClick r:id="rId4"/>
               </a:rPr>
               <a:t>https://</a:t>
             </a:r>
             <a:r>
-              <a:rPr lang="hu-HU" dirty="0" smtClean="0">
+              <a:rPr lang="hu-HU" sz="1600" dirty="0" smtClean="0">
                 <a:hlinkClick r:id="rId4"/>
               </a:rPr>
               <a:t>landcomputer.blog.hu/2020/10/12/5_dolog_amiben_jobb_az_ios_az_androidnal</a:t>
             </a:r>
+            <a:endParaRPr lang="hu-HU" sz="1600" dirty="0" smtClean="0"/>
+          </a:p>
+          <a:p>
+            <a:r>
+              <a:rPr lang="hu-HU" sz="1600" dirty="0">
+                <a:hlinkClick r:id="rId5"/>
+              </a:rPr>
+              <a:t>https://smartclinic.hu/hu/blog/10-dolog-ami-miatt-android-jobb-mint-iphone</a:t>
+            </a:r>
+            <a:r>
+              <a:rPr lang="hu-HU" sz="1600" dirty="0" smtClean="0">
+                <a:hlinkClick r:id="rId5"/>
+              </a:rPr>
+              <a:t>/</a:t>
+            </a:r>
+            <a:endParaRPr lang="hu-HU" sz="1600" dirty="0" smtClean="0"/>
+          </a:p>
+          <a:p>
+            <a:r>
+              <a:rPr lang="hu-HU" sz="1600" dirty="0">
+                <a:hlinkClick r:id="rId6"/>
+              </a:rPr>
+              <a:t>https://</a:t>
+            </a:r>
+            <a:r>
+              <a:rPr lang="hu-HU" sz="1600" dirty="0" smtClean="0">
+                <a:hlinkClick r:id="rId6"/>
+              </a:rPr>
+              <a:t>hows.in/hu/post/elonyok-es-hatranyok-android</a:t>
+            </a:r>
+            <a:endParaRPr lang="hu-HU" sz="1600" dirty="0" smtClean="0"/>
+          </a:p>
+          <a:p>
+            <a:r>
+              <a:rPr lang="hu-HU" sz="1600" dirty="0">
+                <a:hlinkClick r:id="rId7"/>
+              </a:rPr>
+              <a:t>https://www.digitalaptech.com/advantages-and-disadvantages-of-google-android</a:t>
+            </a:r>
+            <a:r>
+              <a:rPr lang="hu-HU" sz="1600" dirty="0" smtClean="0">
+                <a:hlinkClick r:id="rId7"/>
+              </a:rPr>
+              <a:t>/</a:t>
+            </a:r>
+            <a:endParaRPr lang="hu-HU" sz="1600" dirty="0" smtClean="0"/>
+          </a:p>
+          <a:p>
+            <a:r>
+              <a:rPr lang="hu-HU" sz="1600" dirty="0">
+                <a:hlinkClick r:id="rId8"/>
+              </a:rPr>
+              <a:t>https://www.digitalaptech.com/advantages-and-disadvantages-of-ios</a:t>
+            </a:r>
+            <a:r>
+              <a:rPr lang="hu-HU" sz="1600" dirty="0" smtClean="0">
+                <a:hlinkClick r:id="rId8"/>
+              </a:rPr>
+              <a:t>/</a:t>
+            </a:r>
+            <a:endParaRPr lang="hu-HU" sz="1600" dirty="0" smtClean="0"/>
+          </a:p>
+          <a:p>
+            <a:r>
+              <a:rPr lang="hu-HU" sz="1600" dirty="0">
+                <a:hlinkClick r:id="rId9"/>
+              </a:rPr>
+              <a:t>https://geeksmodo.com/disadvantages-of-iphone</a:t>
+            </a:r>
+            <a:r>
+              <a:rPr lang="hu-HU" sz="1600" dirty="0" smtClean="0">
+                <a:hlinkClick r:id="rId9"/>
+              </a:rPr>
+              <a:t>/</a:t>
+            </a:r>
+            <a:endParaRPr lang="hu-HU" sz="1600" dirty="0" smtClean="0"/>
+          </a:p>
+          <a:p>
+            <a:r>
+              <a:rPr lang="hu-HU" sz="1600" dirty="0">
+                <a:hlinkClick r:id="rId10"/>
+              </a:rPr>
+              <a:t>https://iphonegeeks.com/advantages-of-android-over-iphone</a:t>
+            </a:r>
+            <a:r>
+              <a:rPr lang="hu-HU" sz="1600" dirty="0" smtClean="0">
+                <a:hlinkClick r:id="rId10"/>
+              </a:rPr>
+              <a:t>/</a:t>
+            </a:r>
+            <a:endParaRPr lang="hu-HU" sz="1600" dirty="0" smtClean="0"/>
+          </a:p>
+          <a:p>
+            <a:r>
+              <a:rPr lang="hu-HU" sz="1600" dirty="0">
+                <a:hlinkClick r:id="rId11"/>
+              </a:rPr>
+              <a:t>https://www.androidauthority.com/ios-vs-android-1068950</a:t>
+            </a:r>
+            <a:r>
+              <a:rPr lang="hu-HU" sz="1600" dirty="0" smtClean="0">
+                <a:hlinkClick r:id="rId11"/>
+              </a:rPr>
+              <a:t>/</a:t>
+            </a:r>
+            <a:endParaRPr lang="hu-HU" sz="1600" dirty="0" smtClean="0"/>
+          </a:p>
+          <a:p>
+            <a:endParaRPr lang="hu-HU" sz="1600" dirty="0" smtClean="0"/>
+          </a:p>
+          <a:p>
+            <a:endParaRPr lang="hu-HU" sz="1600" dirty="0" smtClean="0"/>
+          </a:p>
+          <a:p>
+            <a:endParaRPr lang="hu-HU" sz="1600" dirty="0" smtClean="0"/>
+          </a:p>
+          <a:p>
             <a:endParaRPr lang="hu-HU" dirty="0" smtClean="0"/>
           </a:p>
           <a:p>
-            <a:r>
-              <a:rPr lang="hu-HU" dirty="0"/>
-              <a:t>https://smartclinic.hu/hu/blog/10-dolog-ami-miatt-android-jobb-mint-iphone/</a:t>
-            </a:r>
             <a:endParaRPr lang="hu-HU" dirty="0" smtClean="0"/>
           </a:p>
         </p:txBody>
@@ -3910,6 +5973,13 @@
   <p:clrMapOvr>
     <a:masterClrMapping/>
   </p:clrMapOvr>
+  <p:timing>
+    <p:tnLst>
+      <p:par>
+        <p:cTn id="1" dur="indefinite" restart="never" nodeType="tmRoot"/>
+      </p:par>
+    </p:tnLst>
+  </p:timing>
 </p:sld>
 </file>
 
@@ -4003,6 +6073,13 @@
   <p:clrMapOvr>
     <a:masterClrMapping/>
   </p:clrMapOvr>
+  <p:timing>
+    <p:tnLst>
+      <p:par>
+        <p:cTn id="1" dur="indefinite" restart="never" nodeType="tmRoot"/>
+      </p:par>
+    </p:tnLst>
+  </p:timing>
 </p:sld>
 </file>
 

</xml_diff>